<commit_message>
updated the data section to accomodate the new figures
</commit_message>
<xml_diff>
--- a/Manuscript/Figures/03_DATA_Description_SYNOP_rainfall.pptx
+++ b/Manuscript/Figures/03_DATA_Description_SYNOP_rainfall.pptx
@@ -5,7 +5,7 @@
     <p:sldMasterId id="2147483684" r:id="rId1"/>
   </p:sldMasterIdLst>
   <p:sldIdLst>
-    <p:sldId id="256" r:id="rId2"/>
+    <p:sldId id="257" r:id="rId2"/>
   </p:sldIdLst>
   <p:sldSz cx="6858000" cy="6480175"/>
   <p:notesSz cx="6858000" cy="9144000"/>
@@ -104,13 +104,18 @@
       </a:defRPr>
     </a:lvl9pPr>
   </p:defaultTextStyle>
+  <p:extLst>
+    <p:ext uri="{EFAFB233-063F-42B5-8137-9DF3F51BA10A}">
+      <p15:sldGuideLst xmlns:p15="http://schemas.microsoft.com/office/powerpoint/2012/main"/>
+    </p:ext>
+  </p:extLst>
 </p:presentation>
 </file>
 
 <file path=ppt/revisionInfo.xml><?xml version="1.0" encoding="utf-8"?>
 <p1510:revInfo xmlns:a="http://schemas.openxmlformats.org/drawingml/2006/main" xmlns:r="http://schemas.openxmlformats.org/officeDocument/2006/relationships" xmlns:p1510="http://schemas.microsoft.com/office/powerpoint/2015/10/main">
   <p1510:revLst>
-    <p1510:client id="{4E4C4081-A929-4B84-98E2-C594EEFABAB1}" v="11" dt="2023-11-13T17:22:49.351"/>
+    <p1510:client id="{4E4C4081-A929-4B84-98E2-C594EEFABAB1}" v="17" dt="2023-11-13T21:41:03.127"/>
   </p1510:revLst>
 </p1510:revInfo>
 </file>
@@ -119,13 +124,13 @@
 <pc:chgInfo xmlns:a="http://schemas.openxmlformats.org/drawingml/2006/main" xmlns:r="http://schemas.openxmlformats.org/officeDocument/2006/relationships" xmlns:ac="http://schemas.microsoft.com/office/drawing/2013/main/command" xmlns:pc="http://schemas.microsoft.com/office/powerpoint/2013/main/command">
   <pc:docChgLst>
     <pc:chgData name="Fatima Pillosu" userId="a6295d4dc9e22643" providerId="LiveId" clId="{4E4C4081-A929-4B84-98E2-C594EEFABAB1}"/>
-    <pc:docChg chg="undo custSel modSld">
-      <pc:chgData name="Fatima Pillosu" userId="a6295d4dc9e22643" providerId="LiveId" clId="{4E4C4081-A929-4B84-98E2-C594EEFABAB1}" dt="2023-11-13T17:24:09.688" v="506" actId="478"/>
+    <pc:docChg chg="undo custSel addSld delSld modSld">
+      <pc:chgData name="Fatima Pillosu" userId="a6295d4dc9e22643" providerId="LiveId" clId="{4E4C4081-A929-4B84-98E2-C594EEFABAB1}" dt="2023-11-13T21:42:44.535" v="917" actId="20577"/>
       <pc:docMkLst>
         <pc:docMk/>
       </pc:docMkLst>
-      <pc:sldChg chg="addSp delSp modSp mod">
-        <pc:chgData name="Fatima Pillosu" userId="a6295d4dc9e22643" providerId="LiveId" clId="{4E4C4081-A929-4B84-98E2-C594EEFABAB1}" dt="2023-11-13T17:24:09.688" v="506" actId="478"/>
+      <pc:sldChg chg="addSp delSp modSp del mod">
+        <pc:chgData name="Fatima Pillosu" userId="a6295d4dc9e22643" providerId="LiveId" clId="{4E4C4081-A929-4B84-98E2-C594EEFABAB1}" dt="2023-11-13T21:36:24.769" v="577" actId="2696"/>
         <pc:sldMkLst>
           <pc:docMk/>
           <pc:sldMk cId="3929477416" sldId="256"/>
@@ -616,6 +621,197 @@
             <pc:docMk/>
             <pc:sldMk cId="3929477416" sldId="256"/>
             <ac:picMk id="45" creationId="{428E0C05-D57B-44C6-F675-A47297D166FA}"/>
+          </ac:picMkLst>
+        </pc:picChg>
+      </pc:sldChg>
+      <pc:sldChg chg="addSp delSp modSp new mod">
+        <pc:chgData name="Fatima Pillosu" userId="a6295d4dc9e22643" providerId="LiveId" clId="{4E4C4081-A929-4B84-98E2-C594EEFABAB1}" dt="2023-11-13T21:42:44.535" v="917" actId="20577"/>
+        <pc:sldMkLst>
+          <pc:docMk/>
+          <pc:sldMk cId="1926658705" sldId="257"/>
+        </pc:sldMkLst>
+        <pc:spChg chg="del">
+          <ac:chgData name="Fatima Pillosu" userId="a6295d4dc9e22643" providerId="LiveId" clId="{4E4C4081-A929-4B84-98E2-C594EEFABAB1}" dt="2023-11-13T21:32:21.183" v="510" actId="478"/>
+          <ac:spMkLst>
+            <pc:docMk/>
+            <pc:sldMk cId="1926658705" sldId="257"/>
+            <ac:spMk id="2" creationId="{0F33C005-43DF-B010-FA42-D57F8678D8ED}"/>
+          </ac:spMkLst>
+        </pc:spChg>
+        <pc:spChg chg="del">
+          <ac:chgData name="Fatima Pillosu" userId="a6295d4dc9e22643" providerId="LiveId" clId="{4E4C4081-A929-4B84-98E2-C594EEFABAB1}" dt="2023-11-13T21:32:20.413" v="509" actId="478"/>
+          <ac:spMkLst>
+            <pc:docMk/>
+            <pc:sldMk cId="1926658705" sldId="257"/>
+            <ac:spMk id="3" creationId="{4FF387B4-ECAE-6055-7A5F-5CFAFB89F2E2}"/>
+          </ac:spMkLst>
+        </pc:spChg>
+        <pc:spChg chg="add mod">
+          <ac:chgData name="Fatima Pillosu" userId="a6295d4dc9e22643" providerId="LiveId" clId="{4E4C4081-A929-4B84-98E2-C594EEFABAB1}" dt="2023-11-13T21:42:16.925" v="910" actId="1076"/>
+          <ac:spMkLst>
+            <pc:docMk/>
+            <pc:sldMk cId="1926658705" sldId="257"/>
+            <ac:spMk id="5" creationId="{F356C156-D0BA-6A82-89AD-9B5CF7D972B7}"/>
+          </ac:spMkLst>
+        </pc:spChg>
+        <pc:spChg chg="add mod">
+          <ac:chgData name="Fatima Pillosu" userId="a6295d4dc9e22643" providerId="LiveId" clId="{4E4C4081-A929-4B84-98E2-C594EEFABAB1}" dt="2023-11-13T21:42:35.030" v="913" actId="20577"/>
+          <ac:spMkLst>
+            <pc:docMk/>
+            <pc:sldMk cId="1926658705" sldId="257"/>
+            <ac:spMk id="6" creationId="{473AB329-803C-9F01-1E88-833A0B6736A7}"/>
+          </ac:spMkLst>
+        </pc:spChg>
+        <pc:spChg chg="add mod">
+          <ac:chgData name="Fatima Pillosu" userId="a6295d4dc9e22643" providerId="LiveId" clId="{4E4C4081-A929-4B84-98E2-C594EEFABAB1}" dt="2023-11-13T21:32:26.674" v="511"/>
+          <ac:spMkLst>
+            <pc:docMk/>
+            <pc:sldMk cId="1926658705" sldId="257"/>
+            <ac:spMk id="7" creationId="{A3275056-A413-519E-813F-5727BB0BB331}"/>
+          </ac:spMkLst>
+        </pc:spChg>
+        <pc:spChg chg="add mod">
+          <ac:chgData name="Fatima Pillosu" userId="a6295d4dc9e22643" providerId="LiveId" clId="{4E4C4081-A929-4B84-98E2-C594EEFABAB1}" dt="2023-11-13T21:41:31.103" v="885" actId="1036"/>
+          <ac:spMkLst>
+            <pc:docMk/>
+            <pc:sldMk cId="1926658705" sldId="257"/>
+            <ac:spMk id="9" creationId="{644B0E76-A94C-F159-87DC-7ECFA8D4E3BB}"/>
+          </ac:spMkLst>
+        </pc:spChg>
+        <pc:spChg chg="add mod">
+          <ac:chgData name="Fatima Pillosu" userId="a6295d4dc9e22643" providerId="LiveId" clId="{4E4C4081-A929-4B84-98E2-C594EEFABAB1}" dt="2023-11-13T21:42:38.051" v="915" actId="20577"/>
+          <ac:spMkLst>
+            <pc:docMk/>
+            <pc:sldMk cId="1926658705" sldId="257"/>
+            <ac:spMk id="10" creationId="{0E77424F-4FB6-0668-A424-15A1A0E97D9B}"/>
+          </ac:spMkLst>
+        </pc:spChg>
+        <pc:spChg chg="add mod">
+          <ac:chgData name="Fatima Pillosu" userId="a6295d4dc9e22643" providerId="LiveId" clId="{4E4C4081-A929-4B84-98E2-C594EEFABAB1}" dt="2023-11-13T21:40:38.886" v="805" actId="1036"/>
+          <ac:spMkLst>
+            <pc:docMk/>
+            <pc:sldMk cId="1926658705" sldId="257"/>
+            <ac:spMk id="11" creationId="{5BD40355-FD15-A6CD-8D36-E91EC1EB21BF}"/>
+          </ac:spMkLst>
+        </pc:spChg>
+        <pc:spChg chg="add mod">
+          <ac:chgData name="Fatima Pillosu" userId="a6295d4dc9e22643" providerId="LiveId" clId="{4E4C4081-A929-4B84-98E2-C594EEFABAB1}" dt="2023-11-13T21:40:38.886" v="805" actId="1036"/>
+          <ac:spMkLst>
+            <pc:docMk/>
+            <pc:sldMk cId="1926658705" sldId="257"/>
+            <ac:spMk id="12" creationId="{AB01EF8E-A058-E83C-7571-9EF75043C4F5}"/>
+          </ac:spMkLst>
+        </pc:spChg>
+        <pc:spChg chg="add mod">
+          <ac:chgData name="Fatima Pillosu" userId="a6295d4dc9e22643" providerId="LiveId" clId="{4E4C4081-A929-4B84-98E2-C594EEFABAB1}" dt="2023-11-13T21:42:24.419" v="911" actId="1076"/>
+          <ac:spMkLst>
+            <pc:docMk/>
+            <pc:sldMk cId="1926658705" sldId="257"/>
+            <ac:spMk id="14" creationId="{13C53EBE-F151-5F15-6739-121CCAF38ABC}"/>
+          </ac:spMkLst>
+        </pc:spChg>
+        <pc:spChg chg="add mod">
+          <ac:chgData name="Fatima Pillosu" userId="a6295d4dc9e22643" providerId="LiveId" clId="{4E4C4081-A929-4B84-98E2-C594EEFABAB1}" dt="2023-11-13T21:42:42.017" v="916" actId="20577"/>
+          <ac:spMkLst>
+            <pc:docMk/>
+            <pc:sldMk cId="1926658705" sldId="257"/>
+            <ac:spMk id="15" creationId="{6B3AF66B-4CBD-202B-FBE6-FFEE56A02835}"/>
+          </ac:spMkLst>
+        </pc:spChg>
+        <pc:spChg chg="add mod">
+          <ac:chgData name="Fatima Pillosu" userId="a6295d4dc9e22643" providerId="LiveId" clId="{4E4C4081-A929-4B84-98E2-C594EEFABAB1}" dt="2023-11-13T21:41:26.812" v="878" actId="1036"/>
+          <ac:spMkLst>
+            <pc:docMk/>
+            <pc:sldMk cId="1926658705" sldId="257"/>
+            <ac:spMk id="17" creationId="{C574AC96-608D-E4BC-B32B-2BDE4A3EBA12}"/>
+          </ac:spMkLst>
+        </pc:spChg>
+        <pc:spChg chg="add mod">
+          <ac:chgData name="Fatima Pillosu" userId="a6295d4dc9e22643" providerId="LiveId" clId="{4E4C4081-A929-4B84-98E2-C594EEFABAB1}" dt="2023-11-13T21:42:44.535" v="917" actId="20577"/>
+          <ac:spMkLst>
+            <pc:docMk/>
+            <pc:sldMk cId="1926658705" sldId="257"/>
+            <ac:spMk id="18" creationId="{E5812496-A40D-2209-7693-0C8AEE6C46D0}"/>
+          </ac:spMkLst>
+        </pc:spChg>
+        <pc:spChg chg="add del mod">
+          <ac:chgData name="Fatima Pillosu" userId="a6295d4dc9e22643" providerId="LiveId" clId="{4E4C4081-A929-4B84-98E2-C594EEFABAB1}" dt="2023-11-13T21:34:33.965" v="525" actId="478"/>
+          <ac:spMkLst>
+            <pc:docMk/>
+            <pc:sldMk cId="1926658705" sldId="257"/>
+            <ac:spMk id="19" creationId="{DB3D9913-E7BB-F746-595D-256BAE9A918C}"/>
+          </ac:spMkLst>
+        </pc:spChg>
+        <pc:spChg chg="add del mod">
+          <ac:chgData name="Fatima Pillosu" userId="a6295d4dc9e22643" providerId="LiveId" clId="{4E4C4081-A929-4B84-98E2-C594EEFABAB1}" dt="2023-11-13T21:34:35.826" v="526" actId="478"/>
+          <ac:spMkLst>
+            <pc:docMk/>
+            <pc:sldMk cId="1926658705" sldId="257"/>
+            <ac:spMk id="20" creationId="{863167F3-F73F-36D8-39F9-4F556D6D7667}"/>
+          </ac:spMkLst>
+        </pc:spChg>
+        <pc:spChg chg="add mod">
+          <ac:chgData name="Fatima Pillosu" userId="a6295d4dc9e22643" providerId="LiveId" clId="{4E4C4081-A929-4B84-98E2-C594EEFABAB1}" dt="2023-11-13T21:40:51.234" v="816" actId="1037"/>
+          <ac:spMkLst>
+            <pc:docMk/>
+            <pc:sldMk cId="1926658705" sldId="257"/>
+            <ac:spMk id="21" creationId="{F26FEE68-9271-5091-96C0-4A3422F1F410}"/>
+          </ac:spMkLst>
+        </pc:spChg>
+        <pc:spChg chg="add mod">
+          <ac:chgData name="Fatima Pillosu" userId="a6295d4dc9e22643" providerId="LiveId" clId="{4E4C4081-A929-4B84-98E2-C594EEFABAB1}" dt="2023-11-13T21:40:55.594" v="824" actId="1038"/>
+          <ac:spMkLst>
+            <pc:docMk/>
+            <pc:sldMk cId="1926658705" sldId="257"/>
+            <ac:spMk id="22" creationId="{F4EB8A69-2485-3291-1661-0757667F0EC2}"/>
+          </ac:spMkLst>
+        </pc:spChg>
+        <pc:spChg chg="add mod">
+          <ac:chgData name="Fatima Pillosu" userId="a6295d4dc9e22643" providerId="LiveId" clId="{4E4C4081-A929-4B84-98E2-C594EEFABAB1}" dt="2023-11-13T21:41:18.686" v="853" actId="1038"/>
+          <ac:spMkLst>
+            <pc:docMk/>
+            <pc:sldMk cId="1926658705" sldId="257"/>
+            <ac:spMk id="23" creationId="{FC188427-E3BE-2B36-A7B0-F2CB699D166A}"/>
+          </ac:spMkLst>
+        </pc:spChg>
+        <pc:spChg chg="add mod">
+          <ac:chgData name="Fatima Pillosu" userId="a6295d4dc9e22643" providerId="LiveId" clId="{4E4C4081-A929-4B84-98E2-C594EEFABAB1}" dt="2023-11-13T21:41:14.495" v="836" actId="1038"/>
+          <ac:spMkLst>
+            <pc:docMk/>
+            <pc:sldMk cId="1926658705" sldId="257"/>
+            <ac:spMk id="24" creationId="{3531DD4E-47F1-5C8A-1F20-C37B91609FDF}"/>
+          </ac:spMkLst>
+        </pc:spChg>
+        <pc:picChg chg="add mod">
+          <ac:chgData name="Fatima Pillosu" userId="a6295d4dc9e22643" providerId="LiveId" clId="{4E4C4081-A929-4B84-98E2-C594EEFABAB1}" dt="2023-11-13T21:42:16.925" v="910" actId="1076"/>
+          <ac:picMkLst>
+            <pc:docMk/>
+            <pc:sldMk cId="1926658705" sldId="257"/>
+            <ac:picMk id="4" creationId="{36F63BC6-EE92-04F0-374C-152031A56BFC}"/>
+          </ac:picMkLst>
+        </pc:picChg>
+        <pc:picChg chg="add mod">
+          <ac:chgData name="Fatima Pillosu" userId="a6295d4dc9e22643" providerId="LiveId" clId="{4E4C4081-A929-4B84-98E2-C594EEFABAB1}" dt="2023-11-13T21:40:21.424" v="745" actId="1076"/>
+          <ac:picMkLst>
+            <pc:docMk/>
+            <pc:sldMk cId="1926658705" sldId="257"/>
+            <ac:picMk id="8" creationId="{3ADABD3E-6CDB-DBF4-93A9-D7ED9B002A08}"/>
+          </ac:picMkLst>
+        </pc:picChg>
+        <pc:picChg chg="add mod">
+          <ac:chgData name="Fatima Pillosu" userId="a6295d4dc9e22643" providerId="LiveId" clId="{4E4C4081-A929-4B84-98E2-C594EEFABAB1}" dt="2023-11-13T21:42:24.419" v="911" actId="1076"/>
+          <ac:picMkLst>
+            <pc:docMk/>
+            <pc:sldMk cId="1926658705" sldId="257"/>
+            <ac:picMk id="13" creationId="{71D8E85F-440F-42EA-923F-E6C4E7358262}"/>
+          </ac:picMkLst>
+        </pc:picChg>
+        <pc:picChg chg="add mod">
+          <ac:chgData name="Fatima Pillosu" userId="a6295d4dc9e22643" providerId="LiveId" clId="{4E4C4081-A929-4B84-98E2-C594EEFABAB1}" dt="2023-11-13T21:40:44.813" v="806" actId="14100"/>
+          <ac:picMkLst>
+            <pc:docMk/>
+            <pc:sldMk cId="1926658705" sldId="257"/>
+            <ac:picMk id="16" creationId="{3764FC39-FC4E-1010-1A50-0021F3B8A331}"/>
           </ac:picMkLst>
         </pc:picChg>
       </pc:sldChg>
@@ -3485,10 +3681,10 @@
       </p:grpSpPr>
       <p:pic>
         <p:nvPicPr>
-          <p:cNvPr id="42" name="Immagine 41" descr="Immagine che contiene testo, diagramma, linea, Diagramma&#10;&#10;Descrizione generata automaticamente">
+          <p:cNvPr id="4" name="Immagine 3" descr="Immagine che contiene testo, diagramma, mappa&#10;&#10;Descrizione generata automaticamente">
             <a:extLst>
               <a:ext uri="{FF2B5EF4-FFF2-40B4-BE49-F238E27FC236}">
-                <a16:creationId xmlns:a16="http://schemas.microsoft.com/office/drawing/2014/main" id="{3AAFB871-7610-A7E7-97CD-1E2E61C3CB61}"/>
+                <a16:creationId xmlns:a16="http://schemas.microsoft.com/office/drawing/2014/main" id="{36F63BC6-EE92-04F0-374C-152031A56BFC}"/>
               </a:ext>
             </a:extLst>
           </p:cNvPr>
@@ -3505,25 +3701,156 @@
               </a:ext>
             </a:extLst>
           </a:blip>
-          <a:srcRect l="8222" t="11015" r="9445" b="2973"/>
+          <a:srcRect l="3861" t="16352" r="38967" b="506"/>
           <a:stretch/>
         </p:blipFill>
         <p:spPr>
           <a:xfrm>
-            <a:off x="2798511" y="4183496"/>
-            <a:ext cx="3829871" cy="2286294"/>
+            <a:off x="646258" y="598043"/>
+            <a:ext cx="2336580" cy="2404075"/>
           </a:xfrm>
           <a:prstGeom prst="rect">
             <a:avLst/>
           </a:prstGeom>
         </p:spPr>
       </p:pic>
+      <p:sp>
+        <p:nvSpPr>
+          <p:cNvPr id="5" name="CasellaDiTesto 4">
+            <a:extLst>
+              <a:ext uri="{FF2B5EF4-FFF2-40B4-BE49-F238E27FC236}">
+                <a16:creationId xmlns:a16="http://schemas.microsoft.com/office/drawing/2014/main" id="{F356C156-D0BA-6A82-89AD-9B5CF7D972B7}"/>
+              </a:ext>
+            </a:extLst>
+          </p:cNvPr>
+          <p:cNvSpPr txBox="1"/>
+          <p:nvPr/>
+        </p:nvSpPr>
+        <p:spPr>
+          <a:xfrm>
+            <a:off x="779496" y="365529"/>
+            <a:ext cx="2095402" cy="215444"/>
+          </a:xfrm>
+          <a:prstGeom prst="rect">
+            <a:avLst/>
+          </a:prstGeom>
+          <a:noFill/>
+        </p:spPr>
+        <p:txBody>
+          <a:bodyPr wrap="square" rtlCol="0">
+            <a:spAutoFit/>
+          </a:bodyPr>
+          <a:lstStyle/>
+          <a:p>
+            <a:pPr algn="ctr"/>
+            <a:r>
+              <a:rPr lang="en-GB" sz="800" dirty="0"/>
+              <a:t>Location of all observations</a:t>
+            </a:r>
+          </a:p>
+        </p:txBody>
+      </p:sp>
+      <p:sp>
+        <p:nvSpPr>
+          <p:cNvPr id="6" name="TextBox 76">
+            <a:extLst>
+              <a:ext uri="{FF2B5EF4-FFF2-40B4-BE49-F238E27FC236}">
+                <a16:creationId xmlns:a16="http://schemas.microsoft.com/office/drawing/2014/main" id="{473AB329-803C-9F01-1E88-833A0B6736A7}"/>
+              </a:ext>
+            </a:extLst>
+          </p:cNvPr>
+          <p:cNvSpPr txBox="1"/>
+          <p:nvPr/>
+        </p:nvSpPr>
+        <p:spPr>
+          <a:xfrm>
+            <a:off x="789711" y="367699"/>
+            <a:ext cx="216000" cy="215444"/>
+          </a:xfrm>
+          <a:prstGeom prst="rect">
+            <a:avLst/>
+          </a:prstGeom>
+          <a:noFill/>
+          <a:ln w="9525">
+            <a:solidFill>
+              <a:schemeClr val="tx1">
+                <a:lumMod val="65000"/>
+                <a:lumOff val="35000"/>
+              </a:schemeClr>
+            </a:solidFill>
+          </a:ln>
+        </p:spPr>
+        <p:txBody>
+          <a:bodyPr wrap="square" rtlCol="0">
+            <a:spAutoFit/>
+          </a:bodyPr>
+          <a:lstStyle/>
+          <a:p>
+            <a:pPr algn="ctr"/>
+            <a:r>
+              <a:rPr lang="it-IT" sz="800" dirty="0">
+                <a:solidFill>
+                  <a:schemeClr val="tx1">
+                    <a:lumMod val="85000"/>
+                    <a:lumOff val="15000"/>
+                  </a:schemeClr>
+                </a:solidFill>
+              </a:rPr>
+              <a:t>a</a:t>
+            </a:r>
+            <a:endParaRPr lang="en-GB" sz="800" dirty="0">
+              <a:solidFill>
+                <a:schemeClr val="tx1">
+                  <a:lumMod val="85000"/>
+                  <a:lumOff val="15000"/>
+                </a:schemeClr>
+              </a:solidFill>
+            </a:endParaRPr>
+          </a:p>
+        </p:txBody>
+      </p:sp>
+      <p:sp>
+        <p:nvSpPr>
+          <p:cNvPr id="7" name="CasellaDiTesto 6">
+            <a:extLst>
+              <a:ext uri="{FF2B5EF4-FFF2-40B4-BE49-F238E27FC236}">
+                <a16:creationId xmlns:a16="http://schemas.microsoft.com/office/drawing/2014/main" id="{A3275056-A413-519E-813F-5727BB0BB331}"/>
+              </a:ext>
+            </a:extLst>
+          </p:cNvPr>
+          <p:cNvSpPr txBox="1"/>
+          <p:nvPr/>
+        </p:nvSpPr>
+        <p:spPr>
+          <a:xfrm>
+            <a:off x="0" y="14830"/>
+            <a:ext cx="6858000" cy="246221"/>
+          </a:xfrm>
+          <a:prstGeom prst="rect">
+            <a:avLst/>
+          </a:prstGeom>
+          <a:noFill/>
+        </p:spPr>
+        <p:txBody>
+          <a:bodyPr wrap="square" rtlCol="0">
+            <a:spAutoFit/>
+          </a:bodyPr>
+          <a:lstStyle/>
+          <a:p>
+            <a:pPr algn="ctr"/>
+            <a:r>
+              <a:rPr lang="en-GB" sz="1000" b="1" dirty="0"/>
+              <a:t>Description of SYNOP observations of 12-hourly rainfall between 2010-01-01 and 2020-12-31</a:t>
+            </a:r>
+          </a:p>
+        </p:txBody>
+      </p:sp>
       <p:pic>
         <p:nvPicPr>
-          <p:cNvPr id="43" name="Immagine 42" descr="Immagine che contiene testo, schermata, diagramma, Diagramma&#10;&#10;Descrizione generata automaticamente">
+          <p:cNvPr id="8" name="Immagine 7" descr="Immagine che contiene testo, schermata, diagramma, Diagramma&#10;&#10;Descrizione generata automaticamente">
             <a:extLst>
               <a:ext uri="{FF2B5EF4-FFF2-40B4-BE49-F238E27FC236}">
-                <a16:creationId xmlns:a16="http://schemas.microsoft.com/office/drawing/2014/main" id="{D5F2A1F4-3589-D5F2-FBB7-4846B064EF46}"/>
+                <a16:creationId xmlns:a16="http://schemas.microsoft.com/office/drawing/2014/main" id="{3ADABD3E-6CDB-DBF4-93A9-D7ED9B002A08}"/>
               </a:ext>
             </a:extLst>
           </p:cNvPr>
@@ -3545,7 +3872,7 @@
         </p:blipFill>
         <p:spPr>
           <a:xfrm>
-            <a:off x="-9993" y="998058"/>
+            <a:off x="39495" y="3840439"/>
             <a:ext cx="3240000" cy="2579090"/>
           </a:xfrm>
           <a:prstGeom prst="rect">
@@ -3553,12 +3880,193 @@
           </a:prstGeom>
         </p:spPr>
       </p:pic>
+      <p:sp>
+        <p:nvSpPr>
+          <p:cNvPr id="9" name="CasellaDiTesto 8">
+            <a:extLst>
+              <a:ext uri="{FF2B5EF4-FFF2-40B4-BE49-F238E27FC236}">
+                <a16:creationId xmlns:a16="http://schemas.microsoft.com/office/drawing/2014/main" id="{644B0E76-A94C-F159-87DC-7ECFA8D4E3BB}"/>
+              </a:ext>
+            </a:extLst>
+          </p:cNvPr>
+          <p:cNvSpPr txBox="1"/>
+          <p:nvPr/>
+        </p:nvSpPr>
+        <p:spPr>
+          <a:xfrm>
+            <a:off x="176487" y="3208283"/>
+            <a:ext cx="3026808" cy="215444"/>
+          </a:xfrm>
+          <a:prstGeom prst="rect">
+            <a:avLst/>
+          </a:prstGeom>
+          <a:noFill/>
+        </p:spPr>
+        <p:txBody>
+          <a:bodyPr wrap="square" rtlCol="0">
+            <a:spAutoFit/>
+          </a:bodyPr>
+          <a:lstStyle/>
+          <a:p>
+            <a:pPr algn="ctr"/>
+            <a:r>
+              <a:rPr lang="en-GB" sz="800" dirty="0"/>
+              <a:t>Counts of observations each day</a:t>
+            </a:r>
+          </a:p>
+        </p:txBody>
+      </p:sp>
+      <p:sp>
+        <p:nvSpPr>
+          <p:cNvPr id="10" name="TextBox 76">
+            <a:extLst>
+              <a:ext uri="{FF2B5EF4-FFF2-40B4-BE49-F238E27FC236}">
+                <a16:creationId xmlns:a16="http://schemas.microsoft.com/office/drawing/2014/main" id="{0E77424F-4FB6-0668-A424-15A1A0E97D9B}"/>
+              </a:ext>
+            </a:extLst>
+          </p:cNvPr>
+          <p:cNvSpPr txBox="1"/>
+          <p:nvPr/>
+        </p:nvSpPr>
+        <p:spPr>
+          <a:xfrm>
+            <a:off x="176487" y="3214095"/>
+            <a:ext cx="216000" cy="215444"/>
+          </a:xfrm>
+          <a:prstGeom prst="rect">
+            <a:avLst/>
+          </a:prstGeom>
+          <a:noFill/>
+          <a:ln w="9525">
+            <a:solidFill>
+              <a:schemeClr val="tx1">
+                <a:lumMod val="65000"/>
+                <a:lumOff val="35000"/>
+              </a:schemeClr>
+            </a:solidFill>
+          </a:ln>
+        </p:spPr>
+        <p:txBody>
+          <a:bodyPr wrap="square" rtlCol="0">
+            <a:spAutoFit/>
+          </a:bodyPr>
+          <a:lstStyle/>
+          <a:p>
+            <a:pPr algn="ctr"/>
+            <a:r>
+              <a:rPr lang="it-IT" sz="800" dirty="0">
+                <a:solidFill>
+                  <a:schemeClr val="tx1">
+                    <a:lumMod val="85000"/>
+                    <a:lumOff val="15000"/>
+                  </a:schemeClr>
+                </a:solidFill>
+              </a:rPr>
+              <a:t>b</a:t>
+            </a:r>
+            <a:endParaRPr lang="en-GB" sz="800" dirty="0">
+              <a:solidFill>
+                <a:schemeClr val="tx1">
+                  <a:lumMod val="85000"/>
+                  <a:lumOff val="15000"/>
+                </a:schemeClr>
+              </a:solidFill>
+            </a:endParaRPr>
+          </a:p>
+        </p:txBody>
+      </p:sp>
+      <p:sp>
+        <p:nvSpPr>
+          <p:cNvPr id="11" name="CasellaDiTesto 10">
+            <a:extLst>
+              <a:ext uri="{FF2B5EF4-FFF2-40B4-BE49-F238E27FC236}">
+                <a16:creationId xmlns:a16="http://schemas.microsoft.com/office/drawing/2014/main" id="{5BD40355-FD15-A6CD-8D36-E91EC1EB21BF}"/>
+              </a:ext>
+            </a:extLst>
+          </p:cNvPr>
+          <p:cNvSpPr txBox="1"/>
+          <p:nvPr/>
+        </p:nvSpPr>
+        <p:spPr>
+          <a:xfrm>
+            <a:off x="233821" y="3465855"/>
+            <a:ext cx="1430867" cy="338554"/>
+          </a:xfrm>
+          <a:prstGeom prst="rect">
+            <a:avLst/>
+          </a:prstGeom>
+          <a:noFill/>
+        </p:spPr>
+        <p:txBody>
+          <a:bodyPr wrap="square" rtlCol="0">
+            <a:spAutoFit/>
+          </a:bodyPr>
+          <a:lstStyle/>
+          <a:p>
+            <a:pPr algn="ctr"/>
+            <a:r>
+              <a:rPr lang="en-GB" sz="800" dirty="0"/>
+              <a:t>Accumulation periods </a:t>
+            </a:r>
+          </a:p>
+          <a:p>
+            <a:pPr algn="ctr"/>
+            <a:r>
+              <a:rPr lang="en-GB" sz="800" dirty="0"/>
+              <a:t>ending at 12 UTC</a:t>
+            </a:r>
+          </a:p>
+        </p:txBody>
+      </p:sp>
+      <p:sp>
+        <p:nvSpPr>
+          <p:cNvPr id="12" name="CasellaDiTesto 11">
+            <a:extLst>
+              <a:ext uri="{FF2B5EF4-FFF2-40B4-BE49-F238E27FC236}">
+                <a16:creationId xmlns:a16="http://schemas.microsoft.com/office/drawing/2014/main" id="{AB01EF8E-A058-E83C-7571-9EF75043C4F5}"/>
+              </a:ext>
+            </a:extLst>
+          </p:cNvPr>
+          <p:cNvSpPr txBox="1"/>
+          <p:nvPr/>
+        </p:nvSpPr>
+        <p:spPr>
+          <a:xfrm>
+            <a:off x="1814548" y="3473517"/>
+            <a:ext cx="1430867" cy="338554"/>
+          </a:xfrm>
+          <a:prstGeom prst="rect">
+            <a:avLst/>
+          </a:prstGeom>
+          <a:noFill/>
+        </p:spPr>
+        <p:txBody>
+          <a:bodyPr wrap="square" rtlCol="0">
+            <a:spAutoFit/>
+          </a:bodyPr>
+          <a:lstStyle/>
+          <a:p>
+            <a:pPr algn="ctr"/>
+            <a:r>
+              <a:rPr lang="en-GB" sz="800" dirty="0"/>
+              <a:t>Accumulation periods </a:t>
+            </a:r>
+          </a:p>
+          <a:p>
+            <a:pPr algn="ctr"/>
+            <a:r>
+              <a:rPr lang="en-GB" sz="800" dirty="0"/>
+              <a:t>ending at 00 UTC</a:t>
+            </a:r>
+          </a:p>
+        </p:txBody>
+      </p:sp>
       <p:pic>
         <p:nvPicPr>
-          <p:cNvPr id="44" name="Immagine 43" descr="Immagine che contiene testo, diagramma, schermata, Diagramma&#10;&#10;Descrizione generata automaticamente">
+          <p:cNvPr id="13" name="Immagine 12" descr="Immagine che contiene testo, diagramma, linea, Diagramma&#10;&#10;Descrizione generata automaticamente">
             <a:extLst>
               <a:ext uri="{FF2B5EF4-FFF2-40B4-BE49-F238E27FC236}">
-                <a16:creationId xmlns:a16="http://schemas.microsoft.com/office/drawing/2014/main" id="{ACF0CAD3-2026-8E34-031C-946C1AE3DD54}"/>
+                <a16:creationId xmlns:a16="http://schemas.microsoft.com/office/drawing/2014/main" id="{71D8E85F-440F-42EA-923F-E6C4E7358262}"/>
               </a:ext>
             </a:extLst>
           </p:cNvPr>
@@ -3575,25 +4083,120 @@
               </a:ext>
             </a:extLst>
           </a:blip>
-          <a:srcRect t="4412"/>
+          <a:srcRect l="8222" t="11015" r="9445" b="2973"/>
           <a:stretch/>
         </p:blipFill>
         <p:spPr>
           <a:xfrm>
-            <a:off x="3267993" y="853784"/>
-            <a:ext cx="3600000" cy="2867639"/>
+            <a:off x="3541800" y="928927"/>
+            <a:ext cx="3240000" cy="1934162"/>
           </a:xfrm>
           <a:prstGeom prst="rect">
             <a:avLst/>
           </a:prstGeom>
         </p:spPr>
       </p:pic>
+      <p:sp>
+        <p:nvSpPr>
+          <p:cNvPr id="14" name="CasellaDiTesto 13">
+            <a:extLst>
+              <a:ext uri="{FF2B5EF4-FFF2-40B4-BE49-F238E27FC236}">
+                <a16:creationId xmlns:a16="http://schemas.microsoft.com/office/drawing/2014/main" id="{13C53EBE-F151-5F15-6739-121CCAF38ABC}"/>
+              </a:ext>
+            </a:extLst>
+          </p:cNvPr>
+          <p:cNvSpPr txBox="1"/>
+          <p:nvPr/>
+        </p:nvSpPr>
+        <p:spPr>
+          <a:xfrm>
+            <a:off x="3717158" y="619453"/>
+            <a:ext cx="3058672" cy="215444"/>
+          </a:xfrm>
+          <a:prstGeom prst="rect">
+            <a:avLst/>
+          </a:prstGeom>
+          <a:noFill/>
+        </p:spPr>
+        <p:txBody>
+          <a:bodyPr wrap="square" rtlCol="0">
+            <a:spAutoFit/>
+          </a:bodyPr>
+          <a:lstStyle/>
+          <a:p>
+            <a:pPr algn="ctr"/>
+            <a:r>
+              <a:rPr lang="en-GB" sz="800" dirty="0"/>
+              <a:t>Rainfall diurnal cycle averaged over the period</a:t>
+            </a:r>
+          </a:p>
+        </p:txBody>
+      </p:sp>
+      <p:sp>
+        <p:nvSpPr>
+          <p:cNvPr id="15" name="TextBox 76">
+            <a:extLst>
+              <a:ext uri="{FF2B5EF4-FFF2-40B4-BE49-F238E27FC236}">
+                <a16:creationId xmlns:a16="http://schemas.microsoft.com/office/drawing/2014/main" id="{6B3AF66B-4CBD-202B-FBE6-FFEE56A02835}"/>
+              </a:ext>
+            </a:extLst>
+          </p:cNvPr>
+          <p:cNvSpPr txBox="1"/>
+          <p:nvPr/>
+        </p:nvSpPr>
+        <p:spPr>
+          <a:xfrm>
+            <a:off x="3717158" y="619454"/>
+            <a:ext cx="216000" cy="215444"/>
+          </a:xfrm>
+          <a:prstGeom prst="rect">
+            <a:avLst/>
+          </a:prstGeom>
+          <a:noFill/>
+          <a:ln w="9525">
+            <a:solidFill>
+              <a:schemeClr val="tx1">
+                <a:lumMod val="65000"/>
+                <a:lumOff val="35000"/>
+              </a:schemeClr>
+            </a:solidFill>
+          </a:ln>
+        </p:spPr>
+        <p:txBody>
+          <a:bodyPr wrap="square" rtlCol="0">
+            <a:spAutoFit/>
+          </a:bodyPr>
+          <a:lstStyle/>
+          <a:p>
+            <a:pPr algn="ctr"/>
+            <a:r>
+              <a:rPr lang="it-IT" sz="800" dirty="0">
+                <a:solidFill>
+                  <a:schemeClr val="tx1">
+                    <a:lumMod val="85000"/>
+                    <a:lumOff val="15000"/>
+                  </a:schemeClr>
+                </a:solidFill>
+              </a:rPr>
+              <a:t>c</a:t>
+            </a:r>
+            <a:endParaRPr lang="en-GB" sz="800" dirty="0">
+              <a:solidFill>
+                <a:schemeClr val="tx1">
+                  <a:lumMod val="85000"/>
+                  <a:lumOff val="15000"/>
+                </a:schemeClr>
+              </a:solidFill>
+            </a:endParaRPr>
+          </a:p>
+        </p:txBody>
+      </p:sp>
       <p:pic>
         <p:nvPicPr>
-          <p:cNvPr id="45" name="Immagine 44" descr="Immagine che contiene testo, diagramma, mappa&#10;&#10;Descrizione generata automaticamente">
+          <p:cNvPr id="16" name="Immagine 15" descr="Immagine che contiene testo, diagramma, schermata, Diagramma&#10;&#10;Descrizione generata automaticamente">
             <a:extLst>
               <a:ext uri="{FF2B5EF4-FFF2-40B4-BE49-F238E27FC236}">
-                <a16:creationId xmlns:a16="http://schemas.microsoft.com/office/drawing/2014/main" id="{428E0C05-D57B-44C6-F675-A47297D166FA}"/>
+                <a16:creationId xmlns:a16="http://schemas.microsoft.com/office/drawing/2014/main" id="{3764FC39-FC4E-1010-1A50-0021F3B8A331}"/>
               </a:ext>
             </a:extLst>
           </p:cNvPr>
@@ -3610,13 +4213,13 @@
               </a:ext>
             </a:extLst>
           </a:blip>
-          <a:srcRect l="3861" t="16352" r="38967" b="506"/>
+          <a:srcRect t="4412"/>
           <a:stretch/>
         </p:blipFill>
         <p:spPr>
           <a:xfrm>
-            <a:off x="292631" y="4064160"/>
-            <a:ext cx="2336580" cy="2404075"/>
+            <a:off x="3363256" y="3635734"/>
+            <a:ext cx="3494743" cy="2783795"/>
           </a:xfrm>
           <a:prstGeom prst="rect">
             <a:avLst/>
@@ -3625,10 +4228,10 @@
       </p:pic>
       <p:sp>
         <p:nvSpPr>
-          <p:cNvPr id="46" name="CasellaDiTesto 45">
+          <p:cNvPr id="17" name="CasellaDiTesto 16">
             <a:extLst>
               <a:ext uri="{FF2B5EF4-FFF2-40B4-BE49-F238E27FC236}">
-                <a16:creationId xmlns:a16="http://schemas.microsoft.com/office/drawing/2014/main" id="{3DB0C739-DD10-1A7C-36DC-BF21D72B625A}"/>
+                <a16:creationId xmlns:a16="http://schemas.microsoft.com/office/drawing/2014/main" id="{C574AC96-608D-E4BC-B32B-2BDE4A3EBA12}"/>
               </a:ext>
             </a:extLst>
           </p:cNvPr>
@@ -3637,43 +4240,7 @@
         </p:nvSpPr>
         <p:spPr>
           <a:xfrm>
-            <a:off x="203199" y="463057"/>
-            <a:ext cx="3026808" cy="215444"/>
-          </a:xfrm>
-          <a:prstGeom prst="rect">
-            <a:avLst/>
-          </a:prstGeom>
-          <a:noFill/>
-        </p:spPr>
-        <p:txBody>
-          <a:bodyPr wrap="square" rtlCol="0">
-            <a:spAutoFit/>
-          </a:bodyPr>
-          <a:lstStyle/>
-          <a:p>
-            <a:pPr algn="ctr"/>
-            <a:r>
-              <a:rPr lang="en-GB" sz="800" dirty="0"/>
-              <a:t>Counts of observations each day</a:t>
-            </a:r>
-          </a:p>
-        </p:txBody>
-      </p:sp>
-      <p:sp>
-        <p:nvSpPr>
-          <p:cNvPr id="47" name="CasellaDiTesto 46">
-            <a:extLst>
-              <a:ext uri="{FF2B5EF4-FFF2-40B4-BE49-F238E27FC236}">
-                <a16:creationId xmlns:a16="http://schemas.microsoft.com/office/drawing/2014/main" id="{4B214471-2687-9D74-9EAE-86F7E1E22056}"/>
-              </a:ext>
-            </a:extLst>
-          </p:cNvPr>
-          <p:cNvSpPr txBox="1"/>
-          <p:nvPr/>
-        </p:nvSpPr>
-        <p:spPr>
-          <a:xfrm>
-            <a:off x="3565672" y="338721"/>
+            <a:off x="3618001" y="3076672"/>
             <a:ext cx="3239999" cy="215444"/>
           </a:xfrm>
           <a:prstGeom prst="rect">
@@ -3697,10 +4264,10 @@
       </p:sp>
       <p:sp>
         <p:nvSpPr>
-          <p:cNvPr id="48" name="CasellaDiTesto 47">
+          <p:cNvPr id="18" name="TextBox 76">
             <a:extLst>
               <a:ext uri="{FF2B5EF4-FFF2-40B4-BE49-F238E27FC236}">
-                <a16:creationId xmlns:a16="http://schemas.microsoft.com/office/drawing/2014/main" id="{A6BA28AE-BD29-E194-F3C8-9579680DC0BB}"/>
+                <a16:creationId xmlns:a16="http://schemas.microsoft.com/office/drawing/2014/main" id="{E5812496-A40D-2209-7693-0C8AEE6C46D0}"/>
               </a:ext>
             </a:extLst>
           </p:cNvPr>
@@ -3709,79 +4276,7 @@
         </p:nvSpPr>
         <p:spPr>
           <a:xfrm>
-            <a:off x="2950133" y="3938109"/>
-            <a:ext cx="3678249" cy="215444"/>
-          </a:xfrm>
-          <a:prstGeom prst="rect">
-            <a:avLst/>
-          </a:prstGeom>
-          <a:noFill/>
-        </p:spPr>
-        <p:txBody>
-          <a:bodyPr wrap="square" rtlCol="0">
-            <a:spAutoFit/>
-          </a:bodyPr>
-          <a:lstStyle/>
-          <a:p>
-            <a:pPr algn="ctr"/>
-            <a:r>
-              <a:rPr lang="en-GB" sz="800" dirty="0"/>
-              <a:t>Rainfall diurnal cycle averaged over the period</a:t>
-            </a:r>
-          </a:p>
-        </p:txBody>
-      </p:sp>
-      <p:sp>
-        <p:nvSpPr>
-          <p:cNvPr id="49" name="CasellaDiTesto 48">
-            <a:extLst>
-              <a:ext uri="{FF2B5EF4-FFF2-40B4-BE49-F238E27FC236}">
-                <a16:creationId xmlns:a16="http://schemas.microsoft.com/office/drawing/2014/main" id="{F60D8305-ED2F-2D44-F671-1CAC919598A1}"/>
-              </a:ext>
-            </a:extLst>
-          </p:cNvPr>
-          <p:cNvSpPr txBox="1"/>
-          <p:nvPr/>
-        </p:nvSpPr>
-        <p:spPr>
-          <a:xfrm>
-            <a:off x="425869" y="3831646"/>
-            <a:ext cx="2095402" cy="215444"/>
-          </a:xfrm>
-          <a:prstGeom prst="rect">
-            <a:avLst/>
-          </a:prstGeom>
-          <a:noFill/>
-        </p:spPr>
-        <p:txBody>
-          <a:bodyPr wrap="square" rtlCol="0">
-            <a:spAutoFit/>
-          </a:bodyPr>
-          <a:lstStyle/>
-          <a:p>
-            <a:pPr algn="ctr"/>
-            <a:r>
-              <a:rPr lang="en-GB" sz="800" dirty="0"/>
-              <a:t>Location of observations</a:t>
-            </a:r>
-          </a:p>
-        </p:txBody>
-      </p:sp>
-      <p:sp>
-        <p:nvSpPr>
-          <p:cNvPr id="50" name="TextBox 76">
-            <a:extLst>
-              <a:ext uri="{FF2B5EF4-FFF2-40B4-BE49-F238E27FC236}">
-                <a16:creationId xmlns:a16="http://schemas.microsoft.com/office/drawing/2014/main" id="{E709C167-143E-9A2D-7679-4788B2B0A112}"/>
-              </a:ext>
-            </a:extLst>
-          </p:cNvPr>
-          <p:cNvSpPr txBox="1"/>
-          <p:nvPr/>
-        </p:nvSpPr>
-        <p:spPr>
-          <a:xfrm>
-            <a:off x="203199" y="468869"/>
+            <a:off x="3785641" y="3076672"/>
             <a:ext cx="216000" cy="215444"/>
           </a:xfrm>
           <a:prstGeom prst="rect">
@@ -3805,7 +4300,7 @@
           <a:p>
             <a:pPr algn="ctr"/>
             <a:r>
-              <a:rPr lang="es-ES" sz="800" dirty="0">
+              <a:rPr lang="es-ES" sz="800">
                 <a:solidFill>
                   <a:schemeClr val="tx1">
                     <a:lumMod val="85000"/>
@@ -3813,7 +4308,7 @@
                   </a:schemeClr>
                 </a:solidFill>
               </a:rPr>
-              <a:t>a</a:t>
+              <a:t>d</a:t>
             </a:r>
             <a:endParaRPr lang="en-GB" sz="800" dirty="0">
               <a:solidFill>
@@ -3828,10 +4323,10 @@
       </p:sp>
       <p:sp>
         <p:nvSpPr>
-          <p:cNvPr id="51" name="TextBox 76">
+          <p:cNvPr id="21" name="CasellaDiTesto 20">
             <a:extLst>
               <a:ext uri="{FF2B5EF4-FFF2-40B4-BE49-F238E27FC236}">
-                <a16:creationId xmlns:a16="http://schemas.microsoft.com/office/drawing/2014/main" id="{65C6A416-D190-455A-A1ED-C62004B73041}"/>
+                <a16:creationId xmlns:a16="http://schemas.microsoft.com/office/drawing/2014/main" id="{F26FEE68-9271-5091-96C0-4A3422F1F410}"/>
               </a:ext>
             </a:extLst>
           </p:cNvPr>
@@ -3840,21 +4335,13 @@
         </p:nvSpPr>
         <p:spPr>
           <a:xfrm>
-            <a:off x="3565672" y="338721"/>
-            <a:ext cx="216000" cy="215444"/>
+            <a:off x="3661816" y="6348998"/>
+            <a:ext cx="1452137" cy="169277"/>
           </a:xfrm>
           <a:prstGeom prst="rect">
             <a:avLst/>
           </a:prstGeom>
           <a:noFill/>
-          <a:ln w="9525">
-            <a:solidFill>
-              <a:schemeClr val="tx1">
-                <a:lumMod val="65000"/>
-                <a:lumOff val="35000"/>
-              </a:schemeClr>
-            </a:solidFill>
-          </a:ln>
         </p:spPr>
         <p:txBody>
           <a:bodyPr wrap="square" rtlCol="0">
@@ -3864,33 +4351,18 @@
           <a:p>
             <a:pPr algn="ctr"/>
             <a:r>
-              <a:rPr lang="es-ES" sz="800" dirty="0">
-                <a:solidFill>
-                  <a:schemeClr val="tx1">
-                    <a:lumMod val="85000"/>
-                    <a:lumOff val="15000"/>
-                  </a:schemeClr>
-                </a:solidFill>
-              </a:rPr>
-              <a:t>b</a:t>
-            </a:r>
-            <a:endParaRPr lang="en-GB" sz="800" dirty="0">
-              <a:solidFill>
-                <a:schemeClr val="tx1">
-                  <a:lumMod val="85000"/>
-                  <a:lumOff val="15000"/>
-                </a:schemeClr>
-              </a:solidFill>
-            </a:endParaRPr>
-          </a:p>
-        </p:txBody>
-      </p:sp>
-      <p:sp>
-        <p:nvSpPr>
-          <p:cNvPr id="52" name="TextBox 76">
+              <a:rPr lang="en-GB" sz="500" dirty="0"/>
+              <a:t>Rainfall [mm /12h]</a:t>
+            </a:r>
+          </a:p>
+        </p:txBody>
+      </p:sp>
+      <p:sp>
+        <p:nvSpPr>
+          <p:cNvPr id="22" name="CasellaDiTesto 21">
             <a:extLst>
               <a:ext uri="{FF2B5EF4-FFF2-40B4-BE49-F238E27FC236}">
-                <a16:creationId xmlns:a16="http://schemas.microsoft.com/office/drawing/2014/main" id="{1A405C2F-F202-5E69-DC08-B75646D965F8}"/>
+                <a16:creationId xmlns:a16="http://schemas.microsoft.com/office/drawing/2014/main" id="{F4EB8A69-2485-3291-1661-0757667F0EC2}"/>
               </a:ext>
             </a:extLst>
           </p:cNvPr>
@@ -3899,21 +4371,13 @@
         </p:nvSpPr>
         <p:spPr>
           <a:xfrm>
-            <a:off x="436084" y="3833816"/>
-            <a:ext cx="216000" cy="215444"/>
+            <a:off x="5354954" y="6348998"/>
+            <a:ext cx="1415926" cy="169277"/>
           </a:xfrm>
           <a:prstGeom prst="rect">
             <a:avLst/>
           </a:prstGeom>
           <a:noFill/>
-          <a:ln w="9525">
-            <a:solidFill>
-              <a:schemeClr val="tx1">
-                <a:lumMod val="65000"/>
-                <a:lumOff val="35000"/>
-              </a:schemeClr>
-            </a:solidFill>
-          </a:ln>
         </p:spPr>
         <p:txBody>
           <a:bodyPr wrap="square" rtlCol="0">
@@ -3923,33 +4387,18 @@
           <a:p>
             <a:pPr algn="ctr"/>
             <a:r>
-              <a:rPr lang="it-IT" sz="800" dirty="0">
-                <a:solidFill>
-                  <a:schemeClr val="tx1">
-                    <a:lumMod val="85000"/>
-                    <a:lumOff val="15000"/>
-                  </a:schemeClr>
-                </a:solidFill>
-              </a:rPr>
-              <a:t>c</a:t>
-            </a:r>
-            <a:endParaRPr lang="en-GB" sz="800" dirty="0">
-              <a:solidFill>
-                <a:schemeClr val="tx1">
-                  <a:lumMod val="85000"/>
-                  <a:lumOff val="15000"/>
-                </a:schemeClr>
-              </a:solidFill>
-            </a:endParaRPr>
-          </a:p>
-        </p:txBody>
-      </p:sp>
-      <p:sp>
-        <p:nvSpPr>
-          <p:cNvPr id="53" name="TextBox 76">
+              <a:rPr lang="en-GB" sz="500" dirty="0"/>
+              <a:t>Rainfall [mm /12h]</a:t>
+            </a:r>
+          </a:p>
+        </p:txBody>
+      </p:sp>
+      <p:sp>
+        <p:nvSpPr>
+          <p:cNvPr id="23" name="CasellaDiTesto 22">
             <a:extLst>
               <a:ext uri="{FF2B5EF4-FFF2-40B4-BE49-F238E27FC236}">
-                <a16:creationId xmlns:a16="http://schemas.microsoft.com/office/drawing/2014/main" id="{6E74432E-779F-5CD3-81EC-888D9F5E99AF}"/>
+                <a16:creationId xmlns:a16="http://schemas.microsoft.com/office/drawing/2014/main" id="{FC188427-E3BE-2B36-A7B0-F2CB699D166A}"/>
               </a:ext>
             </a:extLst>
           </p:cNvPr>
@@ -3958,462 +4407,7 @@
         </p:nvSpPr>
         <p:spPr>
           <a:xfrm>
-            <a:off x="3005577" y="3938109"/>
-            <a:ext cx="216000" cy="215444"/>
-          </a:xfrm>
-          <a:prstGeom prst="rect">
-            <a:avLst/>
-          </a:prstGeom>
-          <a:noFill/>
-          <a:ln w="9525">
-            <a:solidFill>
-              <a:schemeClr val="tx1">
-                <a:lumMod val="65000"/>
-                <a:lumOff val="35000"/>
-              </a:schemeClr>
-            </a:solidFill>
-          </a:ln>
-        </p:spPr>
-        <p:txBody>
-          <a:bodyPr wrap="square" rtlCol="0">
-            <a:spAutoFit/>
-          </a:bodyPr>
-          <a:lstStyle/>
-          <a:p>
-            <a:pPr algn="ctr"/>
-            <a:r>
-              <a:rPr lang="it-IT" sz="800" dirty="0">
-                <a:solidFill>
-                  <a:schemeClr val="tx1">
-                    <a:lumMod val="85000"/>
-                    <a:lumOff val="15000"/>
-                  </a:schemeClr>
-                </a:solidFill>
-              </a:rPr>
-              <a:t>d</a:t>
-            </a:r>
-            <a:endParaRPr lang="en-GB" sz="800" dirty="0">
-              <a:solidFill>
-                <a:schemeClr val="tx1">
-                  <a:lumMod val="85000"/>
-                  <a:lumOff val="15000"/>
-                </a:schemeClr>
-              </a:solidFill>
-            </a:endParaRPr>
-          </a:p>
-        </p:txBody>
-      </p:sp>
-      <p:grpSp>
-        <p:nvGrpSpPr>
-          <p:cNvPr id="54" name="Group 15">
-            <a:extLst>
-              <a:ext uri="{FF2B5EF4-FFF2-40B4-BE49-F238E27FC236}">
-                <a16:creationId xmlns:a16="http://schemas.microsoft.com/office/drawing/2014/main" id="{4EFA0A85-31CF-798F-4855-05A6ADC6D6C5}"/>
-              </a:ext>
-            </a:extLst>
-          </p:cNvPr>
-          <p:cNvGrpSpPr/>
-          <p:nvPr/>
-        </p:nvGrpSpPr>
-        <p:grpSpPr>
-          <a:xfrm>
-            <a:off x="1473570" y="5747842"/>
-            <a:ext cx="1198756" cy="547688"/>
-            <a:chOff x="5534024" y="2867028"/>
-            <a:chExt cx="1198756" cy="547688"/>
-          </a:xfrm>
-        </p:grpSpPr>
-        <p:sp>
-          <p:nvSpPr>
-            <p:cNvPr id="55" name="Rectangle 14">
-              <a:extLst>
-                <a:ext uri="{FF2B5EF4-FFF2-40B4-BE49-F238E27FC236}">
-                  <a16:creationId xmlns:a16="http://schemas.microsoft.com/office/drawing/2014/main" id="{DA6C3228-73BF-C614-0C02-B6F4771E419F}"/>
-                </a:ext>
-              </a:extLst>
-            </p:cNvPr>
-            <p:cNvSpPr/>
-            <p:nvPr/>
-          </p:nvSpPr>
-          <p:spPr>
-            <a:xfrm>
-              <a:off x="5534024" y="2867028"/>
-              <a:ext cx="957262" cy="547688"/>
-            </a:xfrm>
-            <a:prstGeom prst="rect">
-              <a:avLst/>
-            </a:prstGeom>
-            <a:solidFill>
-              <a:schemeClr val="bg1"/>
-            </a:solidFill>
-            <a:ln w="3175">
-              <a:solidFill>
-                <a:schemeClr val="tx1">
-                  <a:lumMod val="65000"/>
-                  <a:lumOff val="35000"/>
-                </a:schemeClr>
-              </a:solidFill>
-            </a:ln>
-          </p:spPr>
-          <p:style>
-            <a:lnRef idx="2">
-              <a:schemeClr val="accent1">
-                <a:shade val="50000"/>
-              </a:schemeClr>
-            </a:lnRef>
-            <a:fillRef idx="1">
-              <a:schemeClr val="accent1"/>
-            </a:fillRef>
-            <a:effectRef idx="0">
-              <a:schemeClr val="accent1"/>
-            </a:effectRef>
-            <a:fontRef idx="minor">
-              <a:schemeClr val="lt1"/>
-            </a:fontRef>
-          </p:style>
-          <p:txBody>
-            <a:bodyPr rtlCol="0" anchor="ctr"/>
-            <a:lstStyle/>
-            <a:p>
-              <a:pPr algn="ctr"/>
-              <a:endParaRPr lang="en-GB" dirty="0"/>
-            </a:p>
-          </p:txBody>
-        </p:sp>
-        <p:sp>
-          <p:nvSpPr>
-            <p:cNvPr id="56" name="Rectangle 7">
-              <a:extLst>
-                <a:ext uri="{FF2B5EF4-FFF2-40B4-BE49-F238E27FC236}">
-                  <a16:creationId xmlns:a16="http://schemas.microsoft.com/office/drawing/2014/main" id="{7FAFAA10-4010-24CA-BB3F-96BF8375127B}"/>
-                </a:ext>
-              </a:extLst>
-            </p:cNvPr>
-            <p:cNvSpPr/>
-            <p:nvPr/>
-          </p:nvSpPr>
-          <p:spPr>
-            <a:xfrm>
-              <a:off x="5613948" y="2937414"/>
-              <a:ext cx="323044" cy="112158"/>
-            </a:xfrm>
-            <a:prstGeom prst="rect">
-              <a:avLst/>
-            </a:prstGeom>
-            <a:solidFill>
-              <a:srgbClr val="EEDA05"/>
-            </a:solidFill>
-            <a:ln w="3175">
-              <a:solidFill>
-                <a:schemeClr val="tx1">
-                  <a:lumMod val="65000"/>
-                  <a:lumOff val="35000"/>
-                </a:schemeClr>
-              </a:solidFill>
-            </a:ln>
-          </p:spPr>
-          <p:style>
-            <a:lnRef idx="2">
-              <a:schemeClr val="accent1">
-                <a:shade val="50000"/>
-              </a:schemeClr>
-            </a:lnRef>
-            <a:fillRef idx="1">
-              <a:schemeClr val="accent1"/>
-            </a:fillRef>
-            <a:effectRef idx="0">
-              <a:schemeClr val="accent1"/>
-            </a:effectRef>
-            <a:fontRef idx="minor">
-              <a:schemeClr val="lt1"/>
-            </a:fontRef>
-          </p:style>
-          <p:txBody>
-            <a:bodyPr rtlCol="0" anchor="ctr"/>
-            <a:lstStyle/>
-            <a:p>
-              <a:pPr algn="ctr"/>
-              <a:endParaRPr lang="en-GB" sz="800">
-                <a:solidFill>
-                  <a:schemeClr val="tx1">
-                    <a:lumMod val="75000"/>
-                    <a:lumOff val="25000"/>
-                  </a:schemeClr>
-                </a:solidFill>
-              </a:endParaRPr>
-            </a:p>
-          </p:txBody>
-        </p:sp>
-        <p:sp>
-          <p:nvSpPr>
-            <p:cNvPr id="57" name="TextBox 8">
-              <a:extLst>
-                <a:ext uri="{FF2B5EF4-FFF2-40B4-BE49-F238E27FC236}">
-                  <a16:creationId xmlns:a16="http://schemas.microsoft.com/office/drawing/2014/main" id="{177928B3-444B-224F-FCCD-576831A599EA}"/>
-                </a:ext>
-              </a:extLst>
-            </p:cNvPr>
-            <p:cNvSpPr txBox="1"/>
-            <p:nvPr/>
-          </p:nvSpPr>
-          <p:spPr>
-            <a:xfrm>
-              <a:off x="5894580" y="2894463"/>
-              <a:ext cx="838200" cy="200055"/>
-            </a:xfrm>
-            <a:prstGeom prst="rect">
-              <a:avLst/>
-            </a:prstGeom>
-            <a:noFill/>
-          </p:spPr>
-          <p:txBody>
-            <a:bodyPr wrap="square" rtlCol="0">
-              <a:spAutoFit/>
-            </a:bodyPr>
-            <a:lstStyle/>
-            <a:p>
-              <a:r>
-                <a:rPr lang="en-GB" sz="700" dirty="0">
-                  <a:solidFill>
-                    <a:schemeClr val="tx1">
-                      <a:lumMod val="75000"/>
-                      <a:lumOff val="25000"/>
-                    </a:schemeClr>
-                  </a:solidFill>
-                </a:rPr>
-                <a:t>“La Costa”</a:t>
-              </a:r>
-            </a:p>
-          </p:txBody>
-        </p:sp>
-        <p:sp>
-          <p:nvSpPr>
-            <p:cNvPr id="58" name="Rectangle 9">
-              <a:extLst>
-                <a:ext uri="{FF2B5EF4-FFF2-40B4-BE49-F238E27FC236}">
-                  <a16:creationId xmlns:a16="http://schemas.microsoft.com/office/drawing/2014/main" id="{5F9EAC62-DFCB-F84A-1C32-FE0381D12147}"/>
-                </a:ext>
-              </a:extLst>
-            </p:cNvPr>
-            <p:cNvSpPr/>
-            <p:nvPr/>
-          </p:nvSpPr>
-          <p:spPr>
-            <a:xfrm>
-              <a:off x="5613948" y="3089813"/>
-              <a:ext cx="323044" cy="112158"/>
-            </a:xfrm>
-            <a:prstGeom prst="rect">
-              <a:avLst/>
-            </a:prstGeom>
-            <a:solidFill>
-              <a:srgbClr val="C29A6C"/>
-            </a:solidFill>
-            <a:ln w="3175">
-              <a:solidFill>
-                <a:schemeClr val="tx1">
-                  <a:lumMod val="65000"/>
-                  <a:lumOff val="35000"/>
-                </a:schemeClr>
-              </a:solidFill>
-            </a:ln>
-          </p:spPr>
-          <p:style>
-            <a:lnRef idx="2">
-              <a:schemeClr val="accent1">
-                <a:shade val="50000"/>
-              </a:schemeClr>
-            </a:lnRef>
-            <a:fillRef idx="1">
-              <a:schemeClr val="accent1"/>
-            </a:fillRef>
-            <a:effectRef idx="0">
-              <a:schemeClr val="accent1"/>
-            </a:effectRef>
-            <a:fontRef idx="minor">
-              <a:schemeClr val="lt1"/>
-            </a:fontRef>
-          </p:style>
-          <p:txBody>
-            <a:bodyPr rtlCol="0" anchor="ctr"/>
-            <a:lstStyle/>
-            <a:p>
-              <a:pPr algn="ctr"/>
-              <a:endParaRPr lang="en-GB" sz="800">
-                <a:solidFill>
-                  <a:schemeClr val="tx1">
-                    <a:lumMod val="75000"/>
-                    <a:lumOff val="25000"/>
-                  </a:schemeClr>
-                </a:solidFill>
-              </a:endParaRPr>
-            </a:p>
-          </p:txBody>
-        </p:sp>
-        <p:sp>
-          <p:nvSpPr>
-            <p:cNvPr id="59" name="TextBox 10">
-              <a:extLst>
-                <a:ext uri="{FF2B5EF4-FFF2-40B4-BE49-F238E27FC236}">
-                  <a16:creationId xmlns:a16="http://schemas.microsoft.com/office/drawing/2014/main" id="{CAF48014-B3EF-69B2-94B1-CF2956B7FBE5}"/>
-                </a:ext>
-              </a:extLst>
-            </p:cNvPr>
-            <p:cNvSpPr txBox="1"/>
-            <p:nvPr/>
-          </p:nvSpPr>
-          <p:spPr>
-            <a:xfrm>
-              <a:off x="5894580" y="3046863"/>
-              <a:ext cx="838200" cy="200055"/>
-            </a:xfrm>
-            <a:prstGeom prst="rect">
-              <a:avLst/>
-            </a:prstGeom>
-            <a:noFill/>
-          </p:spPr>
-          <p:txBody>
-            <a:bodyPr wrap="square" rtlCol="0">
-              <a:spAutoFit/>
-            </a:bodyPr>
-            <a:lstStyle/>
-            <a:p>
-              <a:r>
-                <a:rPr lang="en-GB" sz="700" dirty="0">
-                  <a:solidFill>
-                    <a:schemeClr val="tx1">
-                      <a:lumMod val="75000"/>
-                      <a:lumOff val="25000"/>
-                    </a:schemeClr>
-                  </a:solidFill>
-                </a:rPr>
-                <a:t>“La Sierra”</a:t>
-              </a:r>
-            </a:p>
-          </p:txBody>
-        </p:sp>
-        <p:sp>
-          <p:nvSpPr>
-            <p:cNvPr id="60" name="Rectangle 11">
-              <a:extLst>
-                <a:ext uri="{FF2B5EF4-FFF2-40B4-BE49-F238E27FC236}">
-                  <a16:creationId xmlns:a16="http://schemas.microsoft.com/office/drawing/2014/main" id="{42527528-879F-8D4D-6D0C-5B69EC19E7E6}"/>
-                </a:ext>
-              </a:extLst>
-            </p:cNvPr>
-            <p:cNvSpPr/>
-            <p:nvPr/>
-          </p:nvSpPr>
-          <p:spPr>
-            <a:xfrm>
-              <a:off x="5613948" y="3242213"/>
-              <a:ext cx="323044" cy="112158"/>
-            </a:xfrm>
-            <a:prstGeom prst="rect">
-              <a:avLst/>
-            </a:prstGeom>
-            <a:solidFill>
-              <a:srgbClr val="ACFF00"/>
-            </a:solidFill>
-            <a:ln w="3175">
-              <a:solidFill>
-                <a:schemeClr val="tx1">
-                  <a:lumMod val="65000"/>
-                  <a:lumOff val="35000"/>
-                </a:schemeClr>
-              </a:solidFill>
-            </a:ln>
-          </p:spPr>
-          <p:style>
-            <a:lnRef idx="2">
-              <a:schemeClr val="accent1">
-                <a:shade val="50000"/>
-              </a:schemeClr>
-            </a:lnRef>
-            <a:fillRef idx="1">
-              <a:schemeClr val="accent1"/>
-            </a:fillRef>
-            <a:effectRef idx="0">
-              <a:schemeClr val="accent1"/>
-            </a:effectRef>
-            <a:fontRef idx="minor">
-              <a:schemeClr val="lt1"/>
-            </a:fontRef>
-          </p:style>
-          <p:txBody>
-            <a:bodyPr rtlCol="0" anchor="ctr"/>
-            <a:lstStyle/>
-            <a:p>
-              <a:pPr algn="ctr"/>
-              <a:endParaRPr lang="en-GB" sz="800">
-                <a:solidFill>
-                  <a:schemeClr val="tx1">
-                    <a:lumMod val="75000"/>
-                    <a:lumOff val="25000"/>
-                  </a:schemeClr>
-                </a:solidFill>
-              </a:endParaRPr>
-            </a:p>
-          </p:txBody>
-        </p:sp>
-        <p:sp>
-          <p:nvSpPr>
-            <p:cNvPr id="61" name="TextBox 12">
-              <a:extLst>
-                <a:ext uri="{FF2B5EF4-FFF2-40B4-BE49-F238E27FC236}">
-                  <a16:creationId xmlns:a16="http://schemas.microsoft.com/office/drawing/2014/main" id="{0CB78C39-5E10-6CE2-E04C-ADB3F248B5DD}"/>
-                </a:ext>
-              </a:extLst>
-            </p:cNvPr>
-            <p:cNvSpPr txBox="1"/>
-            <p:nvPr/>
-          </p:nvSpPr>
-          <p:spPr>
-            <a:xfrm>
-              <a:off x="5894580" y="3199262"/>
-              <a:ext cx="838200" cy="200055"/>
-            </a:xfrm>
-            <a:prstGeom prst="rect">
-              <a:avLst/>
-            </a:prstGeom>
-            <a:noFill/>
-          </p:spPr>
-          <p:txBody>
-            <a:bodyPr wrap="square" rtlCol="0">
-              <a:spAutoFit/>
-            </a:bodyPr>
-            <a:lstStyle/>
-            <a:p>
-              <a:r>
-                <a:rPr lang="en-GB" sz="700" dirty="0">
-                  <a:solidFill>
-                    <a:schemeClr val="tx1">
-                      <a:lumMod val="75000"/>
-                      <a:lumOff val="25000"/>
-                    </a:schemeClr>
-                  </a:solidFill>
-                </a:rPr>
-                <a:t>“El Oriente”</a:t>
-              </a:r>
-            </a:p>
-          </p:txBody>
-        </p:sp>
-      </p:grpSp>
-      <p:sp>
-        <p:nvSpPr>
-          <p:cNvPr id="62" name="CasellaDiTesto 61">
-            <a:extLst>
-              <a:ext uri="{FF2B5EF4-FFF2-40B4-BE49-F238E27FC236}">
-                <a16:creationId xmlns:a16="http://schemas.microsoft.com/office/drawing/2014/main" id="{1B4D8079-73F1-4E7B-9A34-D7F024CE599F}"/>
-              </a:ext>
-            </a:extLst>
-          </p:cNvPr>
-          <p:cNvSpPr txBox="1"/>
-          <p:nvPr/>
-        </p:nvSpPr>
-        <p:spPr>
-          <a:xfrm>
-            <a:off x="203199" y="674909"/>
+            <a:off x="3684481" y="3300662"/>
             <a:ext cx="1430867" cy="338554"/>
           </a:xfrm>
           <a:prstGeom prst="rect">
@@ -4444,10 +4438,10 @@
       </p:sp>
       <p:sp>
         <p:nvSpPr>
-          <p:cNvPr id="63" name="CasellaDiTesto 62">
+          <p:cNvPr id="24" name="CasellaDiTesto 23">
             <a:extLst>
               <a:ext uri="{FF2B5EF4-FFF2-40B4-BE49-F238E27FC236}">
-                <a16:creationId xmlns:a16="http://schemas.microsoft.com/office/drawing/2014/main" id="{18014A33-1A87-DA4B-19C9-DF262D0A147C}"/>
+                <a16:creationId xmlns:a16="http://schemas.microsoft.com/office/drawing/2014/main" id="{3531DD4E-47F1-5C8A-1F20-C37B91609FDF}"/>
               </a:ext>
             </a:extLst>
           </p:cNvPr>
@@ -4456,7 +4450,7 @@
         </p:nvSpPr>
         <p:spPr>
           <a:xfrm>
-            <a:off x="1799140" y="674909"/>
+            <a:off x="5350933" y="3308324"/>
             <a:ext cx="1430867" cy="338554"/>
           </a:xfrm>
           <a:prstGeom prst="rect">
@@ -4485,204 +4479,10 @@
           </a:p>
         </p:txBody>
       </p:sp>
-      <p:sp>
-        <p:nvSpPr>
-          <p:cNvPr id="64" name="CasellaDiTesto 63">
-            <a:extLst>
-              <a:ext uri="{FF2B5EF4-FFF2-40B4-BE49-F238E27FC236}">
-                <a16:creationId xmlns:a16="http://schemas.microsoft.com/office/drawing/2014/main" id="{24C2415A-B7B3-77DE-BF15-16E8986E3A1B}"/>
-              </a:ext>
-            </a:extLst>
-          </p:cNvPr>
-          <p:cNvSpPr txBox="1"/>
-          <p:nvPr/>
-        </p:nvSpPr>
-        <p:spPr>
-          <a:xfrm>
-            <a:off x="3565673" y="540042"/>
-            <a:ext cx="1539727" cy="338554"/>
-          </a:xfrm>
-          <a:prstGeom prst="rect">
-            <a:avLst/>
-          </a:prstGeom>
-          <a:noFill/>
-        </p:spPr>
-        <p:txBody>
-          <a:bodyPr wrap="square" rtlCol="0">
-            <a:spAutoFit/>
-          </a:bodyPr>
-          <a:lstStyle/>
-          <a:p>
-            <a:pPr algn="ctr"/>
-            <a:r>
-              <a:rPr lang="en-GB" sz="800" dirty="0"/>
-              <a:t>Accumulation periods </a:t>
-            </a:r>
-          </a:p>
-          <a:p>
-            <a:pPr algn="ctr"/>
-            <a:r>
-              <a:rPr lang="en-GB" sz="800" dirty="0"/>
-              <a:t>ending at 12 UTC</a:t>
-            </a:r>
-          </a:p>
-        </p:txBody>
-      </p:sp>
-      <p:sp>
-        <p:nvSpPr>
-          <p:cNvPr id="65" name="CasellaDiTesto 64">
-            <a:extLst>
-              <a:ext uri="{FF2B5EF4-FFF2-40B4-BE49-F238E27FC236}">
-                <a16:creationId xmlns:a16="http://schemas.microsoft.com/office/drawing/2014/main" id="{F15D2F88-2838-834E-2273-CEBC72728829}"/>
-              </a:ext>
-            </a:extLst>
-          </p:cNvPr>
-          <p:cNvSpPr txBox="1"/>
-          <p:nvPr/>
-        </p:nvSpPr>
-        <p:spPr>
-          <a:xfrm>
-            <a:off x="5374804" y="540042"/>
-            <a:ext cx="1430867" cy="338554"/>
-          </a:xfrm>
-          <a:prstGeom prst="rect">
-            <a:avLst/>
-          </a:prstGeom>
-          <a:noFill/>
-        </p:spPr>
-        <p:txBody>
-          <a:bodyPr wrap="square" rtlCol="0">
-            <a:spAutoFit/>
-          </a:bodyPr>
-          <a:lstStyle/>
-          <a:p>
-            <a:pPr algn="ctr"/>
-            <a:r>
-              <a:rPr lang="en-GB" sz="800" dirty="0"/>
-              <a:t>Accumulation periods </a:t>
-            </a:r>
-          </a:p>
-          <a:p>
-            <a:pPr algn="ctr"/>
-            <a:r>
-              <a:rPr lang="en-GB" sz="800" dirty="0"/>
-              <a:t>ending at 00 UTC</a:t>
-            </a:r>
-          </a:p>
-        </p:txBody>
-      </p:sp>
-      <p:sp>
-        <p:nvSpPr>
-          <p:cNvPr id="68" name="CasellaDiTesto 67">
-            <a:extLst>
-              <a:ext uri="{FF2B5EF4-FFF2-40B4-BE49-F238E27FC236}">
-                <a16:creationId xmlns:a16="http://schemas.microsoft.com/office/drawing/2014/main" id="{EF4D0927-BFD0-0431-CB73-E469D26590A6}"/>
-              </a:ext>
-            </a:extLst>
-          </p:cNvPr>
-          <p:cNvSpPr txBox="1"/>
-          <p:nvPr/>
-        </p:nvSpPr>
-        <p:spPr>
-          <a:xfrm>
-            <a:off x="3565672" y="3664878"/>
-            <a:ext cx="1539728" cy="169277"/>
-          </a:xfrm>
-          <a:prstGeom prst="rect">
-            <a:avLst/>
-          </a:prstGeom>
-          <a:noFill/>
-        </p:spPr>
-        <p:txBody>
-          <a:bodyPr wrap="square" rtlCol="0">
-            <a:spAutoFit/>
-          </a:bodyPr>
-          <a:lstStyle/>
-          <a:p>
-            <a:pPr algn="ctr"/>
-            <a:r>
-              <a:rPr lang="en-GB" sz="500" dirty="0"/>
-              <a:t>Rainfall [mm /12h]</a:t>
-            </a:r>
-          </a:p>
-        </p:txBody>
-      </p:sp>
-      <p:sp>
-        <p:nvSpPr>
-          <p:cNvPr id="69" name="CasellaDiTesto 68">
-            <a:extLst>
-              <a:ext uri="{FF2B5EF4-FFF2-40B4-BE49-F238E27FC236}">
-                <a16:creationId xmlns:a16="http://schemas.microsoft.com/office/drawing/2014/main" id="{BF1A05D3-4D41-3571-0F6C-EF0468E63E2D}"/>
-              </a:ext>
-            </a:extLst>
-          </p:cNvPr>
-          <p:cNvSpPr txBox="1"/>
-          <p:nvPr/>
-        </p:nvSpPr>
-        <p:spPr>
-          <a:xfrm>
-            <a:off x="5284639" y="3664878"/>
-            <a:ext cx="1539728" cy="169277"/>
-          </a:xfrm>
-          <a:prstGeom prst="rect">
-            <a:avLst/>
-          </a:prstGeom>
-          <a:noFill/>
-        </p:spPr>
-        <p:txBody>
-          <a:bodyPr wrap="square" rtlCol="0">
-            <a:spAutoFit/>
-          </a:bodyPr>
-          <a:lstStyle/>
-          <a:p>
-            <a:pPr algn="ctr"/>
-            <a:r>
-              <a:rPr lang="en-GB" sz="500" dirty="0"/>
-              <a:t>Rainfall [mm /12h]</a:t>
-            </a:r>
-          </a:p>
-        </p:txBody>
-      </p:sp>
-      <p:sp>
-        <p:nvSpPr>
-          <p:cNvPr id="70" name="CasellaDiTesto 69">
-            <a:extLst>
-              <a:ext uri="{FF2B5EF4-FFF2-40B4-BE49-F238E27FC236}">
-                <a16:creationId xmlns:a16="http://schemas.microsoft.com/office/drawing/2014/main" id="{CFC95CD7-309B-3E63-D49E-538A0349C3E1}"/>
-              </a:ext>
-            </a:extLst>
-          </p:cNvPr>
-          <p:cNvSpPr txBox="1"/>
-          <p:nvPr/>
-        </p:nvSpPr>
-        <p:spPr>
-          <a:xfrm>
-            <a:off x="0" y="14830"/>
-            <a:ext cx="6858000" cy="246221"/>
-          </a:xfrm>
-          <a:prstGeom prst="rect">
-            <a:avLst/>
-          </a:prstGeom>
-          <a:noFill/>
-        </p:spPr>
-        <p:txBody>
-          <a:bodyPr wrap="square" rtlCol="0">
-            <a:spAutoFit/>
-          </a:bodyPr>
-          <a:lstStyle/>
-          <a:p>
-            <a:pPr algn="ctr"/>
-            <a:r>
-              <a:rPr lang="en-GB" sz="1000" b="1" dirty="0"/>
-              <a:t>Description of SYNOP observations of 12-hourly rainfall between 2010-01-01 and 2020-12-31</a:t>
-            </a:r>
-          </a:p>
-        </p:txBody>
-      </p:sp>
     </p:spTree>
     <p:extLst>
       <p:ext uri="{BB962C8B-B14F-4D97-AF65-F5344CB8AC3E}">
-        <p14:creationId xmlns:p14="http://schemas.microsoft.com/office/powerpoint/2010/main" val="3929477416"/>
+        <p14:creationId xmlns:p14="http://schemas.microsoft.com/office/powerpoint/2010/main" val="1926658705"/>
       </p:ext>
     </p:extLst>
   </p:cSld>

</xml_diff>

<commit_message>
Converted figure from tif to png
</commit_message>
<xml_diff>
--- a/Manuscript/Figures/03_DATA_Description_SYNOP_rainfall.pptx
+++ b/Manuscript/Figures/03_DATA_Description_SYNOP_rainfall.pptx
@@ -115,7 +115,7 @@
 <file path=ppt/revisionInfo.xml><?xml version="1.0" encoding="utf-8"?>
 <p1510:revInfo xmlns:a="http://schemas.openxmlformats.org/drawingml/2006/main" xmlns:r="http://schemas.openxmlformats.org/officeDocument/2006/relationships" xmlns:p1510="http://schemas.microsoft.com/office/powerpoint/2015/10/main">
   <p1510:revLst>
-    <p1510:client id="{4E4C4081-A929-4B84-98E2-C594EEFABAB1}" v="17" dt="2023-11-13T21:41:03.127"/>
+    <p1510:client id="{4E4C4081-A929-4B84-98E2-C594EEFABAB1}" v="19" dt="2023-11-15T13:00:26.253"/>
   </p1510:revLst>
 </p1510:revInfo>
 </file>
@@ -125,7 +125,7 @@
   <pc:docChgLst>
     <pc:chgData name="Fatima Pillosu" userId="a6295d4dc9e22643" providerId="LiveId" clId="{4E4C4081-A929-4B84-98E2-C594EEFABAB1}"/>
     <pc:docChg chg="undo custSel addSld delSld modSld">
-      <pc:chgData name="Fatima Pillosu" userId="a6295d4dc9e22643" providerId="LiveId" clId="{4E4C4081-A929-4B84-98E2-C594EEFABAB1}" dt="2023-11-13T21:42:44.535" v="917" actId="20577"/>
+      <pc:chgData name="Fatima Pillosu" userId="a6295d4dc9e22643" providerId="LiveId" clId="{4E4C4081-A929-4B84-98E2-C594EEFABAB1}" dt="2023-11-15T13:00:30.750" v="933" actId="1038"/>
       <pc:docMkLst>
         <pc:docMk/>
       </pc:docMkLst>
@@ -625,7 +625,7 @@
         </pc:picChg>
       </pc:sldChg>
       <pc:sldChg chg="addSp delSp modSp new mod">
-        <pc:chgData name="Fatima Pillosu" userId="a6295d4dc9e22643" providerId="LiveId" clId="{4E4C4081-A929-4B84-98E2-C594EEFABAB1}" dt="2023-11-13T21:42:44.535" v="917" actId="20577"/>
+        <pc:chgData name="Fatima Pillosu" userId="a6295d4dc9e22643" providerId="LiveId" clId="{4E4C4081-A929-4B84-98E2-C594EEFABAB1}" dt="2023-11-15T13:00:30.750" v="933" actId="1038"/>
         <pc:sldMkLst>
           <pc:docMk/>
           <pc:sldMk cId="1926658705" sldId="257"/>
@@ -742,6 +742,14 @@
             <ac:spMk id="19" creationId="{DB3D9913-E7BB-F746-595D-256BAE9A918C}"/>
           </ac:spMkLst>
         </pc:spChg>
+        <pc:spChg chg="mod">
+          <ac:chgData name="Fatima Pillosu" userId="a6295d4dc9e22643" providerId="LiveId" clId="{4E4C4081-A929-4B84-98E2-C594EEFABAB1}" dt="2023-11-15T13:00:26.253" v="931"/>
+          <ac:spMkLst>
+            <pc:docMk/>
+            <pc:sldMk cId="1926658705" sldId="257"/>
+            <ac:spMk id="20" creationId="{0751CBB7-2FB4-7AB0-1CAD-0DC553D67B35}"/>
+          </ac:spMkLst>
+        </pc:spChg>
         <pc:spChg chg="add del mod">
           <ac:chgData name="Fatima Pillosu" userId="a6295d4dc9e22643" providerId="LiveId" clId="{4E4C4081-A929-4B84-98E2-C594EEFABAB1}" dt="2023-11-13T21:34:35.826" v="526" actId="478"/>
           <ac:spMkLst>
@@ -782,6 +790,70 @@
             <ac:spMk id="24" creationId="{3531DD4E-47F1-5C8A-1F20-C37B91609FDF}"/>
           </ac:spMkLst>
         </pc:spChg>
+        <pc:spChg chg="mod">
+          <ac:chgData name="Fatima Pillosu" userId="a6295d4dc9e22643" providerId="LiveId" clId="{4E4C4081-A929-4B84-98E2-C594EEFABAB1}" dt="2023-11-15T13:00:26.253" v="931"/>
+          <ac:spMkLst>
+            <pc:docMk/>
+            <pc:sldMk cId="1926658705" sldId="257"/>
+            <ac:spMk id="25" creationId="{D489654E-26D0-386B-8F60-A2EF39FA2167}"/>
+          </ac:spMkLst>
+        </pc:spChg>
+        <pc:spChg chg="mod">
+          <ac:chgData name="Fatima Pillosu" userId="a6295d4dc9e22643" providerId="LiveId" clId="{4E4C4081-A929-4B84-98E2-C594EEFABAB1}" dt="2023-11-15T13:00:26.253" v="931"/>
+          <ac:spMkLst>
+            <pc:docMk/>
+            <pc:sldMk cId="1926658705" sldId="257"/>
+            <ac:spMk id="26" creationId="{8BD14432-CE70-B5BA-931B-D517EEF47036}"/>
+          </ac:spMkLst>
+        </pc:spChg>
+        <pc:spChg chg="mod">
+          <ac:chgData name="Fatima Pillosu" userId="a6295d4dc9e22643" providerId="LiveId" clId="{4E4C4081-A929-4B84-98E2-C594EEFABAB1}" dt="2023-11-15T13:00:26.253" v="931"/>
+          <ac:spMkLst>
+            <pc:docMk/>
+            <pc:sldMk cId="1926658705" sldId="257"/>
+            <ac:spMk id="27" creationId="{B01D1D0C-E7CA-F566-5DDD-C02A33A7CA03}"/>
+          </ac:spMkLst>
+        </pc:spChg>
+        <pc:spChg chg="mod">
+          <ac:chgData name="Fatima Pillosu" userId="a6295d4dc9e22643" providerId="LiveId" clId="{4E4C4081-A929-4B84-98E2-C594EEFABAB1}" dt="2023-11-15T13:00:26.253" v="931"/>
+          <ac:spMkLst>
+            <pc:docMk/>
+            <pc:sldMk cId="1926658705" sldId="257"/>
+            <ac:spMk id="28" creationId="{C6F2236B-C69F-5478-98C7-D271E033CC69}"/>
+          </ac:spMkLst>
+        </pc:spChg>
+        <pc:spChg chg="mod">
+          <ac:chgData name="Fatima Pillosu" userId="a6295d4dc9e22643" providerId="LiveId" clId="{4E4C4081-A929-4B84-98E2-C594EEFABAB1}" dt="2023-11-15T13:00:26.253" v="931"/>
+          <ac:spMkLst>
+            <pc:docMk/>
+            <pc:sldMk cId="1926658705" sldId="257"/>
+            <ac:spMk id="29" creationId="{F3004715-639B-890F-7F79-7CAE1271F552}"/>
+          </ac:spMkLst>
+        </pc:spChg>
+        <pc:spChg chg="mod">
+          <ac:chgData name="Fatima Pillosu" userId="a6295d4dc9e22643" providerId="LiveId" clId="{4E4C4081-A929-4B84-98E2-C594EEFABAB1}" dt="2023-11-15T13:00:26.253" v="931"/>
+          <ac:spMkLst>
+            <pc:docMk/>
+            <pc:sldMk cId="1926658705" sldId="257"/>
+            <ac:spMk id="30" creationId="{9F025F6E-8E92-1220-865C-EB5563D53FE9}"/>
+          </ac:spMkLst>
+        </pc:spChg>
+        <pc:grpChg chg="add mod">
+          <ac:chgData name="Fatima Pillosu" userId="a6295d4dc9e22643" providerId="LiveId" clId="{4E4C4081-A929-4B84-98E2-C594EEFABAB1}" dt="2023-11-15T13:00:30.750" v="933" actId="1038"/>
+          <ac:grpSpMkLst>
+            <pc:docMk/>
+            <pc:sldMk cId="1926658705" sldId="257"/>
+            <ac:grpSpMk id="19" creationId="{9205A9DA-BB37-0FAE-CEA3-80B248F442A7}"/>
+          </ac:grpSpMkLst>
+        </pc:grpChg>
+        <pc:picChg chg="add mod modCrop">
+          <ac:chgData name="Fatima Pillosu" userId="a6295d4dc9e22643" providerId="LiveId" clId="{4E4C4081-A929-4B84-98E2-C594EEFABAB1}" dt="2023-11-15T13:00:07.913" v="930" actId="1076"/>
+          <ac:picMkLst>
+            <pc:docMk/>
+            <pc:sldMk cId="1926658705" sldId="257"/>
+            <ac:picMk id="3" creationId="{9AE09C51-1292-09E4-5C99-722655D852BC}"/>
+          </ac:picMkLst>
+        </pc:picChg>
         <pc:picChg chg="add mod">
           <ac:chgData name="Fatima Pillosu" userId="a6295d4dc9e22643" providerId="LiveId" clId="{4E4C4081-A929-4B84-98E2-C594EEFABAB1}" dt="2023-11-13T21:42:16.925" v="910" actId="1076"/>
           <ac:picMkLst>
@@ -798,8 +870,8 @@
             <ac:picMk id="8" creationId="{3ADABD3E-6CDB-DBF4-93A9-D7ED9B002A08}"/>
           </ac:picMkLst>
         </pc:picChg>
-        <pc:picChg chg="add mod">
-          <ac:chgData name="Fatima Pillosu" userId="a6295d4dc9e22643" providerId="LiveId" clId="{4E4C4081-A929-4B84-98E2-C594EEFABAB1}" dt="2023-11-13T21:42:24.419" v="911" actId="1076"/>
+        <pc:picChg chg="add del mod">
+          <ac:chgData name="Fatima Pillosu" userId="a6295d4dc9e22643" providerId="LiveId" clId="{4E4C4081-A929-4B84-98E2-C594EEFABAB1}" dt="2023-11-15T12:59:09.736" v="918" actId="478"/>
           <ac:picMkLst>
             <pc:docMk/>
             <pc:sldMk cId="1926658705" sldId="257"/>
@@ -951,7 +1023,7 @@
           <a:p>
             <a:fld id="{0CDA0B85-A883-4657-ACD6-A138C8FBBE59}" type="datetimeFigureOut">
               <a:rPr lang="en-GB" smtClean="0"/>
-              <a:t>13/11/2023</a:t>
+              <a:t>15/11/2023</a:t>
             </a:fld>
             <a:endParaRPr lang="en-GB"/>
           </a:p>
@@ -1121,7 +1193,7 @@
           <a:p>
             <a:fld id="{0CDA0B85-A883-4657-ACD6-A138C8FBBE59}" type="datetimeFigureOut">
               <a:rPr lang="en-GB" smtClean="0"/>
-              <a:t>13/11/2023</a:t>
+              <a:t>15/11/2023</a:t>
             </a:fld>
             <a:endParaRPr lang="en-GB"/>
           </a:p>
@@ -1301,7 +1373,7 @@
           <a:p>
             <a:fld id="{0CDA0B85-A883-4657-ACD6-A138C8FBBE59}" type="datetimeFigureOut">
               <a:rPr lang="en-GB" smtClean="0"/>
-              <a:t>13/11/2023</a:t>
+              <a:t>15/11/2023</a:t>
             </a:fld>
             <a:endParaRPr lang="en-GB"/>
           </a:p>
@@ -1471,7 +1543,7 @@
           <a:p>
             <a:fld id="{0CDA0B85-A883-4657-ACD6-A138C8FBBE59}" type="datetimeFigureOut">
               <a:rPr lang="en-GB" smtClean="0"/>
-              <a:t>13/11/2023</a:t>
+              <a:t>15/11/2023</a:t>
             </a:fld>
             <a:endParaRPr lang="en-GB"/>
           </a:p>
@@ -1715,7 +1787,7 @@
           <a:p>
             <a:fld id="{0CDA0B85-A883-4657-ACD6-A138C8FBBE59}" type="datetimeFigureOut">
               <a:rPr lang="en-GB" smtClean="0"/>
-              <a:t>13/11/2023</a:t>
+              <a:t>15/11/2023</a:t>
             </a:fld>
             <a:endParaRPr lang="en-GB"/>
           </a:p>
@@ -1947,7 +2019,7 @@
           <a:p>
             <a:fld id="{0CDA0B85-A883-4657-ACD6-A138C8FBBE59}" type="datetimeFigureOut">
               <a:rPr lang="en-GB" smtClean="0"/>
-              <a:t>13/11/2023</a:t>
+              <a:t>15/11/2023</a:t>
             </a:fld>
             <a:endParaRPr lang="en-GB"/>
           </a:p>
@@ -2314,7 +2386,7 @@
           <a:p>
             <a:fld id="{0CDA0B85-A883-4657-ACD6-A138C8FBBE59}" type="datetimeFigureOut">
               <a:rPr lang="en-GB" smtClean="0"/>
-              <a:t>13/11/2023</a:t>
+              <a:t>15/11/2023</a:t>
             </a:fld>
             <a:endParaRPr lang="en-GB"/>
           </a:p>
@@ -2432,7 +2504,7 @@
           <a:p>
             <a:fld id="{0CDA0B85-A883-4657-ACD6-A138C8FBBE59}" type="datetimeFigureOut">
               <a:rPr lang="en-GB" smtClean="0"/>
-              <a:t>13/11/2023</a:t>
+              <a:t>15/11/2023</a:t>
             </a:fld>
             <a:endParaRPr lang="en-GB"/>
           </a:p>
@@ -2527,7 +2599,7 @@
           <a:p>
             <a:fld id="{0CDA0B85-A883-4657-ACD6-A138C8FBBE59}" type="datetimeFigureOut">
               <a:rPr lang="en-GB" smtClean="0"/>
-              <a:t>13/11/2023</a:t>
+              <a:t>15/11/2023</a:t>
             </a:fld>
             <a:endParaRPr lang="en-GB"/>
           </a:p>
@@ -2804,7 +2876,7 @@
           <a:p>
             <a:fld id="{0CDA0B85-A883-4657-ACD6-A138C8FBBE59}" type="datetimeFigureOut">
               <a:rPr lang="en-GB" smtClean="0"/>
-              <a:t>13/11/2023</a:t>
+              <a:t>15/11/2023</a:t>
             </a:fld>
             <a:endParaRPr lang="en-GB"/>
           </a:p>
@@ -3061,7 +3133,7 @@
           <a:p>
             <a:fld id="{0CDA0B85-A883-4657-ACD6-A138C8FBBE59}" type="datetimeFigureOut">
               <a:rPr lang="en-GB" smtClean="0"/>
-              <a:t>13/11/2023</a:t>
+              <a:t>15/11/2023</a:t>
             </a:fld>
             <a:endParaRPr lang="en-GB"/>
           </a:p>
@@ -3274,7 +3346,7 @@
           <a:p>
             <a:fld id="{0CDA0B85-A883-4657-ACD6-A138C8FBBE59}" type="datetimeFigureOut">
               <a:rPr lang="en-GB" smtClean="0"/>
-              <a:t>13/11/2023</a:t>
+              <a:t>15/11/2023</a:t>
             </a:fld>
             <a:endParaRPr lang="en-GB"/>
           </a:p>
@@ -4061,41 +4133,6 @@
           </a:p>
         </p:txBody>
       </p:sp>
-      <p:pic>
-        <p:nvPicPr>
-          <p:cNvPr id="13" name="Immagine 12" descr="Immagine che contiene testo, diagramma, linea, Diagramma&#10;&#10;Descrizione generata automaticamente">
-            <a:extLst>
-              <a:ext uri="{FF2B5EF4-FFF2-40B4-BE49-F238E27FC236}">
-                <a16:creationId xmlns:a16="http://schemas.microsoft.com/office/drawing/2014/main" id="{71D8E85F-440F-42EA-923F-E6C4E7358262}"/>
-              </a:ext>
-            </a:extLst>
-          </p:cNvPr>
-          <p:cNvPicPr>
-            <a:picLocks noChangeAspect="1"/>
-          </p:cNvPicPr>
-          <p:nvPr/>
-        </p:nvPicPr>
-        <p:blipFill rotWithShape="1">
-          <a:blip r:embed="rId4">
-            <a:extLst>
-              <a:ext uri="{28A0092B-C50C-407E-A947-70E740481C1C}">
-                <a14:useLocalDpi xmlns:a14="http://schemas.microsoft.com/office/drawing/2010/main" val="0"/>
-              </a:ext>
-            </a:extLst>
-          </a:blip>
-          <a:srcRect l="8222" t="11015" r="9445" b="2973"/>
-          <a:stretch/>
-        </p:blipFill>
-        <p:spPr>
-          <a:xfrm>
-            <a:off x="3541800" y="928927"/>
-            <a:ext cx="3240000" cy="1934162"/>
-          </a:xfrm>
-          <a:prstGeom prst="rect">
-            <a:avLst/>
-          </a:prstGeom>
-        </p:spPr>
-      </p:pic>
       <p:sp>
         <p:nvSpPr>
           <p:cNvPr id="14" name="CasellaDiTesto 13">
@@ -4206,7 +4243,7 @@
           <p:nvPr/>
         </p:nvPicPr>
         <p:blipFill rotWithShape="1">
-          <a:blip r:embed="rId5">
+          <a:blip r:embed="rId4">
             <a:extLst>
               <a:ext uri="{28A0092B-C50C-407E-A947-70E740481C1C}">
                 <a14:useLocalDpi xmlns:a14="http://schemas.microsoft.com/office/drawing/2010/main" val="0"/>
@@ -4479,6 +4516,437 @@
           </a:p>
         </p:txBody>
       </p:sp>
+      <p:pic>
+        <p:nvPicPr>
+          <p:cNvPr id="3" name="Immagine 2" descr="Immagine che contiene testo, diagramma, linea, Diagramma&#10;&#10;Descrizione generata automaticamente">
+            <a:extLst>
+              <a:ext uri="{FF2B5EF4-FFF2-40B4-BE49-F238E27FC236}">
+                <a16:creationId xmlns:a16="http://schemas.microsoft.com/office/drawing/2014/main" id="{9AE09C51-1292-09E4-5C99-722655D852BC}"/>
+              </a:ext>
+            </a:extLst>
+          </p:cNvPr>
+          <p:cNvPicPr>
+            <a:picLocks noChangeAspect="1"/>
+          </p:cNvPicPr>
+          <p:nvPr/>
+        </p:nvPicPr>
+        <p:blipFill rotWithShape="1">
+          <a:blip r:embed="rId5">
+            <a:extLst>
+              <a:ext uri="{28A0092B-C50C-407E-A947-70E740481C1C}">
+                <a14:useLocalDpi xmlns:a14="http://schemas.microsoft.com/office/drawing/2010/main" val="0"/>
+              </a:ext>
+            </a:extLst>
+          </a:blip>
+          <a:srcRect l="7442" t="10623" r="9424" b="2775"/>
+          <a:stretch/>
+        </p:blipFill>
+        <p:spPr>
+          <a:xfrm>
+            <a:off x="3359115" y="922982"/>
+            <a:ext cx="3343044" cy="1989985"/>
+          </a:xfrm>
+          <a:prstGeom prst="rect">
+            <a:avLst/>
+          </a:prstGeom>
+        </p:spPr>
+      </p:pic>
+      <p:grpSp>
+        <p:nvGrpSpPr>
+          <p:cNvPr id="19" name="Group 15">
+            <a:extLst>
+              <a:ext uri="{FF2B5EF4-FFF2-40B4-BE49-F238E27FC236}">
+                <a16:creationId xmlns:a16="http://schemas.microsoft.com/office/drawing/2014/main" id="{9205A9DA-BB37-0FAE-CEA3-80B248F442A7}"/>
+              </a:ext>
+            </a:extLst>
+          </p:cNvPr>
+          <p:cNvGrpSpPr/>
+          <p:nvPr/>
+        </p:nvGrpSpPr>
+        <p:grpSpPr>
+          <a:xfrm>
+            <a:off x="1823340" y="2283669"/>
+            <a:ext cx="1198756" cy="547688"/>
+            <a:chOff x="5534024" y="2867028"/>
+            <a:chExt cx="1198756" cy="547688"/>
+          </a:xfrm>
+        </p:grpSpPr>
+        <p:sp>
+          <p:nvSpPr>
+            <p:cNvPr id="20" name="Rectangle 14">
+              <a:extLst>
+                <a:ext uri="{FF2B5EF4-FFF2-40B4-BE49-F238E27FC236}">
+                  <a16:creationId xmlns:a16="http://schemas.microsoft.com/office/drawing/2014/main" id="{0751CBB7-2FB4-7AB0-1CAD-0DC553D67B35}"/>
+                </a:ext>
+              </a:extLst>
+            </p:cNvPr>
+            <p:cNvSpPr/>
+            <p:nvPr/>
+          </p:nvSpPr>
+          <p:spPr>
+            <a:xfrm>
+              <a:off x="5534024" y="2867028"/>
+              <a:ext cx="957262" cy="547688"/>
+            </a:xfrm>
+            <a:prstGeom prst="rect">
+              <a:avLst/>
+            </a:prstGeom>
+            <a:solidFill>
+              <a:schemeClr val="bg1"/>
+            </a:solidFill>
+            <a:ln w="3175">
+              <a:solidFill>
+                <a:schemeClr val="tx1">
+                  <a:lumMod val="65000"/>
+                  <a:lumOff val="35000"/>
+                </a:schemeClr>
+              </a:solidFill>
+            </a:ln>
+          </p:spPr>
+          <p:style>
+            <a:lnRef idx="2">
+              <a:schemeClr val="accent1">
+                <a:shade val="50000"/>
+              </a:schemeClr>
+            </a:lnRef>
+            <a:fillRef idx="1">
+              <a:schemeClr val="accent1"/>
+            </a:fillRef>
+            <a:effectRef idx="0">
+              <a:schemeClr val="accent1"/>
+            </a:effectRef>
+            <a:fontRef idx="minor">
+              <a:schemeClr val="lt1"/>
+            </a:fontRef>
+          </p:style>
+          <p:txBody>
+            <a:bodyPr rtlCol="0" anchor="ctr"/>
+            <a:lstStyle/>
+            <a:p>
+              <a:pPr algn="ctr"/>
+              <a:endParaRPr lang="en-GB" dirty="0"/>
+            </a:p>
+          </p:txBody>
+        </p:sp>
+        <p:sp>
+          <p:nvSpPr>
+            <p:cNvPr id="25" name="Rectangle 7">
+              <a:extLst>
+                <a:ext uri="{FF2B5EF4-FFF2-40B4-BE49-F238E27FC236}">
+                  <a16:creationId xmlns:a16="http://schemas.microsoft.com/office/drawing/2014/main" id="{D489654E-26D0-386B-8F60-A2EF39FA2167}"/>
+                </a:ext>
+              </a:extLst>
+            </p:cNvPr>
+            <p:cNvSpPr/>
+            <p:nvPr/>
+          </p:nvSpPr>
+          <p:spPr>
+            <a:xfrm>
+              <a:off x="5613948" y="2937414"/>
+              <a:ext cx="323044" cy="112158"/>
+            </a:xfrm>
+            <a:prstGeom prst="rect">
+              <a:avLst/>
+            </a:prstGeom>
+            <a:solidFill>
+              <a:srgbClr val="EEDA05"/>
+            </a:solidFill>
+            <a:ln w="3175">
+              <a:solidFill>
+                <a:schemeClr val="tx1">
+                  <a:lumMod val="65000"/>
+                  <a:lumOff val="35000"/>
+                </a:schemeClr>
+              </a:solidFill>
+            </a:ln>
+          </p:spPr>
+          <p:style>
+            <a:lnRef idx="2">
+              <a:schemeClr val="accent1">
+                <a:shade val="50000"/>
+              </a:schemeClr>
+            </a:lnRef>
+            <a:fillRef idx="1">
+              <a:schemeClr val="accent1"/>
+            </a:fillRef>
+            <a:effectRef idx="0">
+              <a:schemeClr val="accent1"/>
+            </a:effectRef>
+            <a:fontRef idx="minor">
+              <a:schemeClr val="lt1"/>
+            </a:fontRef>
+          </p:style>
+          <p:txBody>
+            <a:bodyPr rtlCol="0" anchor="ctr"/>
+            <a:lstStyle/>
+            <a:p>
+              <a:pPr algn="ctr"/>
+              <a:endParaRPr lang="en-GB" sz="800">
+                <a:solidFill>
+                  <a:schemeClr val="tx1">
+                    <a:lumMod val="75000"/>
+                    <a:lumOff val="25000"/>
+                  </a:schemeClr>
+                </a:solidFill>
+              </a:endParaRPr>
+            </a:p>
+          </p:txBody>
+        </p:sp>
+        <p:sp>
+          <p:nvSpPr>
+            <p:cNvPr id="26" name="TextBox 8">
+              <a:extLst>
+                <a:ext uri="{FF2B5EF4-FFF2-40B4-BE49-F238E27FC236}">
+                  <a16:creationId xmlns:a16="http://schemas.microsoft.com/office/drawing/2014/main" id="{8BD14432-CE70-B5BA-931B-D517EEF47036}"/>
+                </a:ext>
+              </a:extLst>
+            </p:cNvPr>
+            <p:cNvSpPr txBox="1"/>
+            <p:nvPr/>
+          </p:nvSpPr>
+          <p:spPr>
+            <a:xfrm>
+              <a:off x="5894580" y="2894463"/>
+              <a:ext cx="838200" cy="200055"/>
+            </a:xfrm>
+            <a:prstGeom prst="rect">
+              <a:avLst/>
+            </a:prstGeom>
+            <a:noFill/>
+          </p:spPr>
+          <p:txBody>
+            <a:bodyPr wrap="square" rtlCol="0">
+              <a:spAutoFit/>
+            </a:bodyPr>
+            <a:lstStyle/>
+            <a:p>
+              <a:r>
+                <a:rPr lang="en-GB" sz="700" dirty="0">
+                  <a:solidFill>
+                    <a:schemeClr val="tx1">
+                      <a:lumMod val="75000"/>
+                      <a:lumOff val="25000"/>
+                    </a:schemeClr>
+                  </a:solidFill>
+                </a:rPr>
+                <a:t>“La Costa”</a:t>
+              </a:r>
+            </a:p>
+          </p:txBody>
+        </p:sp>
+        <p:sp>
+          <p:nvSpPr>
+            <p:cNvPr id="27" name="Rectangle 9">
+              <a:extLst>
+                <a:ext uri="{FF2B5EF4-FFF2-40B4-BE49-F238E27FC236}">
+                  <a16:creationId xmlns:a16="http://schemas.microsoft.com/office/drawing/2014/main" id="{B01D1D0C-E7CA-F566-5DDD-C02A33A7CA03}"/>
+                </a:ext>
+              </a:extLst>
+            </p:cNvPr>
+            <p:cNvSpPr/>
+            <p:nvPr/>
+          </p:nvSpPr>
+          <p:spPr>
+            <a:xfrm>
+              <a:off x="5613948" y="3089813"/>
+              <a:ext cx="323044" cy="112158"/>
+            </a:xfrm>
+            <a:prstGeom prst="rect">
+              <a:avLst/>
+            </a:prstGeom>
+            <a:solidFill>
+              <a:srgbClr val="C29A6C"/>
+            </a:solidFill>
+            <a:ln w="3175">
+              <a:solidFill>
+                <a:schemeClr val="tx1">
+                  <a:lumMod val="65000"/>
+                  <a:lumOff val="35000"/>
+                </a:schemeClr>
+              </a:solidFill>
+            </a:ln>
+          </p:spPr>
+          <p:style>
+            <a:lnRef idx="2">
+              <a:schemeClr val="accent1">
+                <a:shade val="50000"/>
+              </a:schemeClr>
+            </a:lnRef>
+            <a:fillRef idx="1">
+              <a:schemeClr val="accent1"/>
+            </a:fillRef>
+            <a:effectRef idx="0">
+              <a:schemeClr val="accent1"/>
+            </a:effectRef>
+            <a:fontRef idx="minor">
+              <a:schemeClr val="lt1"/>
+            </a:fontRef>
+          </p:style>
+          <p:txBody>
+            <a:bodyPr rtlCol="0" anchor="ctr"/>
+            <a:lstStyle/>
+            <a:p>
+              <a:pPr algn="ctr"/>
+              <a:endParaRPr lang="en-GB" sz="800">
+                <a:solidFill>
+                  <a:schemeClr val="tx1">
+                    <a:lumMod val="75000"/>
+                    <a:lumOff val="25000"/>
+                  </a:schemeClr>
+                </a:solidFill>
+              </a:endParaRPr>
+            </a:p>
+          </p:txBody>
+        </p:sp>
+        <p:sp>
+          <p:nvSpPr>
+            <p:cNvPr id="28" name="TextBox 10">
+              <a:extLst>
+                <a:ext uri="{FF2B5EF4-FFF2-40B4-BE49-F238E27FC236}">
+                  <a16:creationId xmlns:a16="http://schemas.microsoft.com/office/drawing/2014/main" id="{C6F2236B-C69F-5478-98C7-D271E033CC69}"/>
+                </a:ext>
+              </a:extLst>
+            </p:cNvPr>
+            <p:cNvSpPr txBox="1"/>
+            <p:nvPr/>
+          </p:nvSpPr>
+          <p:spPr>
+            <a:xfrm>
+              <a:off x="5894580" y="3046863"/>
+              <a:ext cx="838200" cy="200055"/>
+            </a:xfrm>
+            <a:prstGeom prst="rect">
+              <a:avLst/>
+            </a:prstGeom>
+            <a:noFill/>
+          </p:spPr>
+          <p:txBody>
+            <a:bodyPr wrap="square" rtlCol="0">
+              <a:spAutoFit/>
+            </a:bodyPr>
+            <a:lstStyle/>
+            <a:p>
+              <a:r>
+                <a:rPr lang="en-GB" sz="700" dirty="0">
+                  <a:solidFill>
+                    <a:schemeClr val="tx1">
+                      <a:lumMod val="75000"/>
+                      <a:lumOff val="25000"/>
+                    </a:schemeClr>
+                  </a:solidFill>
+                </a:rPr>
+                <a:t>“La Sierra”</a:t>
+              </a:r>
+            </a:p>
+          </p:txBody>
+        </p:sp>
+        <p:sp>
+          <p:nvSpPr>
+            <p:cNvPr id="29" name="Rectangle 11">
+              <a:extLst>
+                <a:ext uri="{FF2B5EF4-FFF2-40B4-BE49-F238E27FC236}">
+                  <a16:creationId xmlns:a16="http://schemas.microsoft.com/office/drawing/2014/main" id="{F3004715-639B-890F-7F79-7CAE1271F552}"/>
+                </a:ext>
+              </a:extLst>
+            </p:cNvPr>
+            <p:cNvSpPr/>
+            <p:nvPr/>
+          </p:nvSpPr>
+          <p:spPr>
+            <a:xfrm>
+              <a:off x="5613948" y="3242213"/>
+              <a:ext cx="323044" cy="112158"/>
+            </a:xfrm>
+            <a:prstGeom prst="rect">
+              <a:avLst/>
+            </a:prstGeom>
+            <a:solidFill>
+              <a:srgbClr val="ACFF00"/>
+            </a:solidFill>
+            <a:ln w="3175">
+              <a:solidFill>
+                <a:schemeClr val="tx1">
+                  <a:lumMod val="65000"/>
+                  <a:lumOff val="35000"/>
+                </a:schemeClr>
+              </a:solidFill>
+            </a:ln>
+          </p:spPr>
+          <p:style>
+            <a:lnRef idx="2">
+              <a:schemeClr val="accent1">
+                <a:shade val="50000"/>
+              </a:schemeClr>
+            </a:lnRef>
+            <a:fillRef idx="1">
+              <a:schemeClr val="accent1"/>
+            </a:fillRef>
+            <a:effectRef idx="0">
+              <a:schemeClr val="accent1"/>
+            </a:effectRef>
+            <a:fontRef idx="minor">
+              <a:schemeClr val="lt1"/>
+            </a:fontRef>
+          </p:style>
+          <p:txBody>
+            <a:bodyPr rtlCol="0" anchor="ctr"/>
+            <a:lstStyle/>
+            <a:p>
+              <a:pPr algn="ctr"/>
+              <a:endParaRPr lang="en-GB" sz="800">
+                <a:solidFill>
+                  <a:schemeClr val="tx1">
+                    <a:lumMod val="75000"/>
+                    <a:lumOff val="25000"/>
+                  </a:schemeClr>
+                </a:solidFill>
+              </a:endParaRPr>
+            </a:p>
+          </p:txBody>
+        </p:sp>
+        <p:sp>
+          <p:nvSpPr>
+            <p:cNvPr id="30" name="TextBox 12">
+              <a:extLst>
+                <a:ext uri="{FF2B5EF4-FFF2-40B4-BE49-F238E27FC236}">
+                  <a16:creationId xmlns:a16="http://schemas.microsoft.com/office/drawing/2014/main" id="{9F025F6E-8E92-1220-865C-EB5563D53FE9}"/>
+                </a:ext>
+              </a:extLst>
+            </p:cNvPr>
+            <p:cNvSpPr txBox="1"/>
+            <p:nvPr/>
+          </p:nvSpPr>
+          <p:spPr>
+            <a:xfrm>
+              <a:off x="5894580" y="3199262"/>
+              <a:ext cx="838200" cy="200055"/>
+            </a:xfrm>
+            <a:prstGeom prst="rect">
+              <a:avLst/>
+            </a:prstGeom>
+            <a:noFill/>
+          </p:spPr>
+          <p:txBody>
+            <a:bodyPr wrap="square" rtlCol="0">
+              <a:spAutoFit/>
+            </a:bodyPr>
+            <a:lstStyle/>
+            <a:p>
+              <a:r>
+                <a:rPr lang="en-GB" sz="700" dirty="0">
+                  <a:solidFill>
+                    <a:schemeClr val="tx1">
+                      <a:lumMod val="75000"/>
+                      <a:lumOff val="25000"/>
+                    </a:schemeClr>
+                  </a:solidFill>
+                </a:rPr>
+                <a:t>“El Oriente”</a:t>
+              </a:r>
+            </a:p>
+          </p:txBody>
+        </p:sp>
+      </p:grpSp>
     </p:spTree>
     <p:extLst>
       <p:ext uri="{BB962C8B-B14F-4D97-AF65-F5344CB8AC3E}">

</xml_diff>